<commit_message>
updating API style images
</commit_message>
<xml_diff>
--- a/modules/img/api-styles.pptx
+++ b/modules/img/api-styles.pptx
@@ -108,6 +108,11 @@
       </a:defRPr>
     </a:lvl9pPr>
   </p:defaultTextStyle>
+  <p:extLst>
+    <p:ext uri="{EFAFB233-063F-42B5-8137-9DF3F51BA10A}">
+      <p15:sldGuideLst xmlns:p15="http://schemas.microsoft.com/office/powerpoint/2012/main"/>
+    </p:ext>
+  </p:extLst>
 </p:presentation>
 </file>
 
@@ -258,7 +263,7 @@
           <a:p>
             <a:fld id="{B50B1E95-426A-EB4B-A616-E031B71F156C}" type="datetimeFigureOut">
               <a:rPr lang="en-US" smtClean="0"/>
-              <a:t>4/6/18</a:t>
+              <a:t>10/5/18</a:t>
             </a:fld>
             <a:endParaRPr lang="en-US"/>
           </a:p>
@@ -456,7 +461,7 @@
           <a:p>
             <a:fld id="{B50B1E95-426A-EB4B-A616-E031B71F156C}" type="datetimeFigureOut">
               <a:rPr lang="en-US" smtClean="0"/>
-              <a:t>4/6/18</a:t>
+              <a:t>10/5/18</a:t>
             </a:fld>
             <a:endParaRPr lang="en-US"/>
           </a:p>
@@ -664,7 +669,7 @@
           <a:p>
             <a:fld id="{B50B1E95-426A-EB4B-A616-E031B71F156C}" type="datetimeFigureOut">
               <a:rPr lang="en-US" smtClean="0"/>
-              <a:t>4/6/18</a:t>
+              <a:t>10/5/18</a:t>
             </a:fld>
             <a:endParaRPr lang="en-US"/>
           </a:p>
@@ -862,7 +867,7 @@
           <a:p>
             <a:fld id="{B50B1E95-426A-EB4B-A616-E031B71F156C}" type="datetimeFigureOut">
               <a:rPr lang="en-US" smtClean="0"/>
-              <a:t>4/6/18</a:t>
+              <a:t>10/5/18</a:t>
             </a:fld>
             <a:endParaRPr lang="en-US"/>
           </a:p>
@@ -1137,7 +1142,7 @@
           <a:p>
             <a:fld id="{B50B1E95-426A-EB4B-A616-E031B71F156C}" type="datetimeFigureOut">
               <a:rPr lang="en-US" smtClean="0"/>
-              <a:t>4/6/18</a:t>
+              <a:t>10/5/18</a:t>
             </a:fld>
             <a:endParaRPr lang="en-US"/>
           </a:p>
@@ -1402,7 +1407,7 @@
           <a:p>
             <a:fld id="{B50B1E95-426A-EB4B-A616-E031B71F156C}" type="datetimeFigureOut">
               <a:rPr lang="en-US" smtClean="0"/>
-              <a:t>4/6/18</a:t>
+              <a:t>10/5/18</a:t>
             </a:fld>
             <a:endParaRPr lang="en-US"/>
           </a:p>
@@ -1814,7 +1819,7 @@
           <a:p>
             <a:fld id="{B50B1E95-426A-EB4B-A616-E031B71F156C}" type="datetimeFigureOut">
               <a:rPr lang="en-US" smtClean="0"/>
-              <a:t>4/6/18</a:t>
+              <a:t>10/5/18</a:t>
             </a:fld>
             <a:endParaRPr lang="en-US"/>
           </a:p>
@@ -1955,7 +1960,7 @@
           <a:p>
             <a:fld id="{B50B1E95-426A-EB4B-A616-E031B71F156C}" type="datetimeFigureOut">
               <a:rPr lang="en-US" smtClean="0"/>
-              <a:t>4/6/18</a:t>
+              <a:t>10/5/18</a:t>
             </a:fld>
             <a:endParaRPr lang="en-US"/>
           </a:p>
@@ -2068,7 +2073,7 @@
           <a:p>
             <a:fld id="{B50B1E95-426A-EB4B-A616-E031B71F156C}" type="datetimeFigureOut">
               <a:rPr lang="en-US" smtClean="0"/>
-              <a:t>4/6/18</a:t>
+              <a:t>10/5/18</a:t>
             </a:fld>
             <a:endParaRPr lang="en-US"/>
           </a:p>
@@ -2379,7 +2384,7 @@
           <a:p>
             <a:fld id="{B50B1E95-426A-EB4B-A616-E031B71F156C}" type="datetimeFigureOut">
               <a:rPr lang="en-US" smtClean="0"/>
-              <a:t>4/6/18</a:t>
+              <a:t>10/5/18</a:t>
             </a:fld>
             <a:endParaRPr lang="en-US"/>
           </a:p>
@@ -2667,7 +2672,7 @@
           <a:p>
             <a:fld id="{B50B1E95-426A-EB4B-A616-E031B71F156C}" type="datetimeFigureOut">
               <a:rPr lang="en-US" smtClean="0"/>
-              <a:t>4/6/18</a:t>
+              <a:t>10/5/18</a:t>
             </a:fld>
             <a:endParaRPr lang="en-US"/>
           </a:p>
@@ -2908,7 +2913,7 @@
           <a:p>
             <a:fld id="{B50B1E95-426A-EB4B-A616-E031B71F156C}" type="datetimeFigureOut">
               <a:rPr lang="en-US" smtClean="0"/>
-              <a:t>4/6/18</a:t>
+              <a:t>10/5/18</a:t>
             </a:fld>
             <a:endParaRPr lang="en-US"/>
           </a:p>
@@ -4359,10 +4364,10 @@
       </p:grpSpPr>
       <p:sp>
         <p:nvSpPr>
-          <p:cNvPr id="6" name="Rectangle 5">
-            <a:extLst>
-              <a:ext uri="{FF2B5EF4-FFF2-40B4-BE49-F238E27FC236}">
-                <a16:creationId xmlns:a16="http://schemas.microsoft.com/office/drawing/2014/main" id="{942BB3BF-4373-9044-AF29-E94584F1EDF1}"/>
+          <p:cNvPr id="34" name="Rectangle 33">
+            <a:extLst>
+              <a:ext uri="{FF2B5EF4-FFF2-40B4-BE49-F238E27FC236}">
+                <a16:creationId xmlns:a16="http://schemas.microsoft.com/office/drawing/2014/main" id="{46FF8005-6B53-464B-9648-FF9F17D9B413}"/>
               </a:ext>
             </a:extLst>
           </p:cNvPr>
@@ -4370,107 +4375,9 @@
           <p:nvPr/>
         </p:nvSpPr>
         <p:spPr>
-          <a:xfrm rot="16200000">
-            <a:off x="1451111" y="3187147"/>
-            <a:ext cx="5989986" cy="596349"/>
-          </a:xfrm>
-          <a:prstGeom prst="rect">
-            <a:avLst/>
-          </a:prstGeom>
-        </p:spPr>
-        <p:style>
-          <a:lnRef idx="2">
-            <a:schemeClr val="accent1">
-              <a:shade val="50000"/>
-            </a:schemeClr>
-          </a:lnRef>
-          <a:fillRef idx="1">
-            <a:schemeClr val="accent1"/>
-          </a:fillRef>
-          <a:effectRef idx="0">
-            <a:schemeClr val="accent1"/>
-          </a:effectRef>
-          <a:fontRef idx="minor">
-            <a:schemeClr val="lt1"/>
-          </a:fontRef>
-        </p:style>
-        <p:txBody>
-          <a:bodyPr rtlCol="0" anchor="ctr"/>
-          <a:lstStyle/>
-          <a:p>
-            <a:pPr algn="ctr"/>
-            <a:r>
-              <a:rPr lang="en-US" dirty="0"/>
-              <a:t>URI API</a:t>
-            </a:r>
-          </a:p>
-        </p:txBody>
-      </p:sp>
-      <p:sp>
-        <p:nvSpPr>
-          <p:cNvPr id="7" name="Rectangle 6">
-            <a:extLst>
-              <a:ext uri="{FF2B5EF4-FFF2-40B4-BE49-F238E27FC236}">
-                <a16:creationId xmlns:a16="http://schemas.microsoft.com/office/drawing/2014/main" id="{A0950097-100D-A246-8719-4B894DDB761D}"/>
-              </a:ext>
-            </a:extLst>
-          </p:cNvPr>
-          <p:cNvSpPr/>
-          <p:nvPr/>
-        </p:nvSpPr>
-        <p:spPr>
-          <a:xfrm>
-            <a:off x="795130" y="3008244"/>
-            <a:ext cx="2001078" cy="954157"/>
-          </a:xfrm>
-          <a:prstGeom prst="rect">
-            <a:avLst/>
-          </a:prstGeom>
-        </p:spPr>
-        <p:style>
-          <a:lnRef idx="2">
-            <a:schemeClr val="accent1">
-              <a:shade val="50000"/>
-            </a:schemeClr>
-          </a:lnRef>
-          <a:fillRef idx="1">
-            <a:schemeClr val="accent1"/>
-          </a:fillRef>
-          <a:effectRef idx="0">
-            <a:schemeClr val="accent1"/>
-          </a:effectRef>
-          <a:fontRef idx="minor">
-            <a:schemeClr val="lt1"/>
-          </a:fontRef>
-        </p:style>
-        <p:txBody>
-          <a:bodyPr rtlCol="0" anchor="ctr"/>
-          <a:lstStyle/>
-          <a:p>
-            <a:pPr algn="ctr"/>
-            <a:r>
-              <a:rPr lang="en-US" dirty="0"/>
-              <a:t>Client</a:t>
-            </a:r>
-          </a:p>
-        </p:txBody>
-      </p:sp>
-      <p:sp>
-        <p:nvSpPr>
-          <p:cNvPr id="8" name="Rectangle 7">
-            <a:extLst>
-              <a:ext uri="{FF2B5EF4-FFF2-40B4-BE49-F238E27FC236}">
-                <a16:creationId xmlns:a16="http://schemas.microsoft.com/office/drawing/2014/main" id="{52459A10-8E90-AF4D-BE29-A0363E4638D5}"/>
-              </a:ext>
-            </a:extLst>
-          </p:cNvPr>
-          <p:cNvSpPr/>
-          <p:nvPr/>
-        </p:nvSpPr>
-        <p:spPr>
-          <a:xfrm>
-            <a:off x="5599043" y="490328"/>
-            <a:ext cx="5751443" cy="2764638"/>
+          <a:xfrm>
+            <a:off x="5599042" y="4652021"/>
+            <a:ext cx="5751443" cy="822324"/>
           </a:xfrm>
           <a:prstGeom prst="rect">
             <a:avLst/>
@@ -4507,6 +4414,204 @@
       </p:sp>
       <p:sp>
         <p:nvSpPr>
+          <p:cNvPr id="32" name="Rectangle 31">
+            <a:extLst>
+              <a:ext uri="{FF2B5EF4-FFF2-40B4-BE49-F238E27FC236}">
+                <a16:creationId xmlns:a16="http://schemas.microsoft.com/office/drawing/2014/main" id="{D4DEDA25-7E95-134F-A7F0-9507B9B2307B}"/>
+              </a:ext>
+            </a:extLst>
+          </p:cNvPr>
+          <p:cNvSpPr/>
+          <p:nvPr/>
+        </p:nvSpPr>
+        <p:spPr>
+          <a:xfrm>
+            <a:off x="5599043" y="5600797"/>
+            <a:ext cx="5751443" cy="879518"/>
+          </a:xfrm>
+          <a:prstGeom prst="rect">
+            <a:avLst/>
+          </a:prstGeom>
+        </p:spPr>
+        <p:style>
+          <a:lnRef idx="2">
+            <a:schemeClr val="accent1">
+              <a:shade val="50000"/>
+            </a:schemeClr>
+          </a:lnRef>
+          <a:fillRef idx="1">
+            <a:schemeClr val="accent1"/>
+          </a:fillRef>
+          <a:effectRef idx="0">
+            <a:schemeClr val="accent1"/>
+          </a:effectRef>
+          <a:fontRef idx="minor">
+            <a:schemeClr val="lt1"/>
+          </a:fontRef>
+        </p:style>
+        <p:txBody>
+          <a:bodyPr rtlCol="0" anchor="ctr"/>
+          <a:lstStyle/>
+          <a:p>
+            <a:pPr algn="ctr"/>
+            <a:endParaRPr lang="en-US">
+              <a:solidFill>
+                <a:schemeClr val="tx1"/>
+              </a:solidFill>
+            </a:endParaRPr>
+          </a:p>
+        </p:txBody>
+      </p:sp>
+      <p:sp>
+        <p:nvSpPr>
+          <p:cNvPr id="6" name="Rectangle 5">
+            <a:extLst>
+              <a:ext uri="{FF2B5EF4-FFF2-40B4-BE49-F238E27FC236}">
+                <a16:creationId xmlns:a16="http://schemas.microsoft.com/office/drawing/2014/main" id="{942BB3BF-4373-9044-AF29-E94584F1EDF1}"/>
+              </a:ext>
+            </a:extLst>
+          </p:cNvPr>
+          <p:cNvSpPr/>
+          <p:nvPr/>
+        </p:nvSpPr>
+        <p:spPr>
+          <a:xfrm rot="16200000">
+            <a:off x="1451111" y="3187147"/>
+            <a:ext cx="5989986" cy="596349"/>
+          </a:xfrm>
+          <a:prstGeom prst="rect">
+            <a:avLst/>
+          </a:prstGeom>
+        </p:spPr>
+        <p:style>
+          <a:lnRef idx="2">
+            <a:schemeClr val="accent1">
+              <a:shade val="50000"/>
+            </a:schemeClr>
+          </a:lnRef>
+          <a:fillRef idx="1">
+            <a:schemeClr val="accent1"/>
+          </a:fillRef>
+          <a:effectRef idx="0">
+            <a:schemeClr val="accent1"/>
+          </a:effectRef>
+          <a:fontRef idx="minor">
+            <a:schemeClr val="lt1"/>
+          </a:fontRef>
+        </p:style>
+        <p:txBody>
+          <a:bodyPr rtlCol="0" anchor="ctr"/>
+          <a:lstStyle/>
+          <a:p>
+            <a:pPr algn="ctr"/>
+            <a:r>
+              <a:rPr lang="en-US" dirty="0"/>
+              <a:t>URI API</a:t>
+            </a:r>
+          </a:p>
+        </p:txBody>
+      </p:sp>
+      <p:sp>
+        <p:nvSpPr>
+          <p:cNvPr id="7" name="Rectangle 6">
+            <a:extLst>
+              <a:ext uri="{FF2B5EF4-FFF2-40B4-BE49-F238E27FC236}">
+                <a16:creationId xmlns:a16="http://schemas.microsoft.com/office/drawing/2014/main" id="{A0950097-100D-A246-8719-4B894DDB761D}"/>
+              </a:ext>
+            </a:extLst>
+          </p:cNvPr>
+          <p:cNvSpPr/>
+          <p:nvPr/>
+        </p:nvSpPr>
+        <p:spPr>
+          <a:xfrm>
+            <a:off x="795130" y="3008244"/>
+            <a:ext cx="2001078" cy="954157"/>
+          </a:xfrm>
+          <a:prstGeom prst="rect">
+            <a:avLst/>
+          </a:prstGeom>
+        </p:spPr>
+        <p:style>
+          <a:lnRef idx="2">
+            <a:schemeClr val="accent1">
+              <a:shade val="50000"/>
+            </a:schemeClr>
+          </a:lnRef>
+          <a:fillRef idx="1">
+            <a:schemeClr val="accent1"/>
+          </a:fillRef>
+          <a:effectRef idx="0">
+            <a:schemeClr val="accent1"/>
+          </a:effectRef>
+          <a:fontRef idx="minor">
+            <a:schemeClr val="lt1"/>
+          </a:fontRef>
+        </p:style>
+        <p:txBody>
+          <a:bodyPr rtlCol="0" anchor="ctr"/>
+          <a:lstStyle/>
+          <a:p>
+            <a:pPr algn="ctr"/>
+            <a:r>
+              <a:rPr lang="en-US" dirty="0"/>
+              <a:t>Client</a:t>
+            </a:r>
+          </a:p>
+        </p:txBody>
+      </p:sp>
+      <p:sp>
+        <p:nvSpPr>
+          <p:cNvPr id="8" name="Rectangle 7">
+            <a:extLst>
+              <a:ext uri="{FF2B5EF4-FFF2-40B4-BE49-F238E27FC236}">
+                <a16:creationId xmlns:a16="http://schemas.microsoft.com/office/drawing/2014/main" id="{52459A10-8E90-AF4D-BE29-A0363E4638D5}"/>
+              </a:ext>
+            </a:extLst>
+          </p:cNvPr>
+          <p:cNvSpPr/>
+          <p:nvPr/>
+        </p:nvSpPr>
+        <p:spPr>
+          <a:xfrm>
+            <a:off x="5599043" y="490328"/>
+            <a:ext cx="5751443" cy="2764638"/>
+          </a:xfrm>
+          <a:prstGeom prst="rect">
+            <a:avLst/>
+          </a:prstGeom>
+        </p:spPr>
+        <p:style>
+          <a:lnRef idx="2">
+            <a:schemeClr val="accent1">
+              <a:shade val="50000"/>
+            </a:schemeClr>
+          </a:lnRef>
+          <a:fillRef idx="1">
+            <a:schemeClr val="accent1"/>
+          </a:fillRef>
+          <a:effectRef idx="0">
+            <a:schemeClr val="accent1"/>
+          </a:effectRef>
+          <a:fontRef idx="minor">
+            <a:schemeClr val="lt1"/>
+          </a:fontRef>
+        </p:style>
+        <p:txBody>
+          <a:bodyPr rtlCol="0" anchor="ctr"/>
+          <a:lstStyle/>
+          <a:p>
+            <a:pPr algn="ctr"/>
+            <a:endParaRPr lang="en-US">
+              <a:solidFill>
+                <a:schemeClr val="tx1"/>
+              </a:solidFill>
+            </a:endParaRPr>
+          </a:p>
+        </p:txBody>
+      </p:sp>
+      <p:sp>
+        <p:nvSpPr>
           <p:cNvPr id="9" name="Rectangle 8">
             <a:extLst>
               <a:ext uri="{FF2B5EF4-FFF2-40B4-BE49-F238E27FC236}">
@@ -4877,7 +4982,7 @@
         <p:spPr>
           <a:xfrm>
             <a:off x="5599043" y="3709729"/>
-            <a:ext cx="5751443" cy="2764638"/>
+            <a:ext cx="5751443" cy="821838"/>
           </a:xfrm>
           <a:prstGeom prst="rect">
             <a:avLst/>
@@ -4926,7 +5031,7 @@
         </p:nvSpPr>
         <p:spPr>
           <a:xfrm>
-            <a:off x="6089374" y="4165177"/>
+            <a:off x="6076902" y="3858890"/>
             <a:ext cx="2227729" cy="543339"/>
           </a:xfrm>
           <a:prstGeom prst="rect">
@@ -4985,7 +5090,7 @@
         </p:nvSpPr>
         <p:spPr>
           <a:xfrm>
-            <a:off x="6096000" y="5523524"/>
+            <a:off x="6096000" y="5785004"/>
             <a:ext cx="2227729" cy="543339"/>
           </a:xfrm>
           <a:prstGeom prst="rect">
@@ -5044,7 +5149,7 @@
         </p:nvSpPr>
         <p:spPr>
           <a:xfrm>
-            <a:off x="6096000" y="4860916"/>
+            <a:off x="6076902" y="4809732"/>
             <a:ext cx="2227729" cy="543339"/>
           </a:xfrm>
           <a:prstGeom prst="rect">
@@ -5151,7 +5256,7 @@
         </p:nvCxnSpPr>
         <p:spPr>
           <a:xfrm>
-            <a:off x="4764157" y="5794755"/>
+            <a:off x="4764157" y="6056235"/>
             <a:ext cx="1331843" cy="439"/>
           </a:xfrm>
           <a:prstGeom prst="straightConnector1">
@@ -5196,7 +5301,7 @@
         </p:nvCxnSpPr>
         <p:spPr>
           <a:xfrm>
-            <a:off x="4764157" y="4436847"/>
+            <a:off x="4751685" y="4130560"/>
             <a:ext cx="1325217" cy="0"/>
           </a:xfrm>
           <a:prstGeom prst="straightConnector1">
@@ -5241,7 +5346,7 @@
         </p:nvCxnSpPr>
         <p:spPr>
           <a:xfrm flipV="1">
-            <a:off x="4744279" y="5132586"/>
+            <a:off x="4725181" y="5081402"/>
             <a:ext cx="1351721" cy="15688"/>
           </a:xfrm>
           <a:prstGeom prst="straightConnector1">
@@ -5330,7 +5435,7 @@
         </p:nvCxnSpPr>
         <p:spPr>
           <a:xfrm>
-            <a:off x="4154555" y="5148274"/>
+            <a:off x="4135457" y="5097090"/>
             <a:ext cx="609602" cy="1"/>
           </a:xfrm>
           <a:prstGeom prst="straightConnector1">
@@ -5373,8 +5478,8 @@
         </p:nvSpPr>
         <p:spPr>
           <a:xfrm>
-            <a:off x="8719930" y="4165177"/>
-            <a:ext cx="2227729" cy="1901686"/>
+            <a:off x="8707458" y="3858890"/>
+            <a:ext cx="2227729" cy="543339"/>
           </a:xfrm>
           <a:prstGeom prst="rect">
             <a:avLst/>
@@ -5416,17 +5521,6 @@
               <a:t>Implementation</a:t>
             </a:r>
           </a:p>
-          <a:p>
-            <a:pPr algn="ctr"/>
-            <a:r>
-              <a:rPr lang="en-US" dirty="0">
-                <a:solidFill>
-                  <a:schemeClr val="tx1"/>
-                </a:solidFill>
-              </a:rPr>
-              <a:t>Details</a:t>
-            </a:r>
-          </a:p>
         </p:txBody>
       </p:sp>
       <p:sp>
@@ -5484,17 +5578,6 @@
                 </a:solidFill>
               </a:rPr>
               <a:t>Implementation</a:t>
-            </a:r>
-          </a:p>
-          <a:p>
-            <a:pPr algn="ctr"/>
-            <a:r>
-              <a:rPr lang="en-US" dirty="0">
-                <a:solidFill>
-                  <a:schemeClr val="tx1"/>
-                </a:solidFill>
-              </a:rPr>
-              <a:t>Details</a:t>
             </a:r>
           </a:p>
         </p:txBody>
@@ -5560,7 +5643,7 @@
         </p:nvCxnSpPr>
         <p:spPr>
           <a:xfrm>
-            <a:off x="4160401" y="4424714"/>
+            <a:off x="4147929" y="4118427"/>
             <a:ext cx="609602" cy="1"/>
           </a:xfrm>
           <a:prstGeom prst="straightConnector1">
@@ -5605,7 +5688,7 @@
         </p:nvCxnSpPr>
         <p:spPr>
           <a:xfrm>
-            <a:off x="4154555" y="5794753"/>
+            <a:off x="4154555" y="6056233"/>
             <a:ext cx="609602" cy="1"/>
           </a:xfrm>
           <a:prstGeom prst="straightConnector1">
@@ -5742,7 +5825,7 @@
         <p:spPr>
           <a:xfrm>
             <a:off x="2796208" y="3485323"/>
-            <a:ext cx="1358347" cy="962537"/>
+            <a:ext cx="1350941" cy="633104"/>
           </a:xfrm>
           <a:prstGeom prst="straightConnector1">
             <a:avLst/>
@@ -5832,7 +5915,7 @@
         <p:spPr>
           <a:xfrm>
             <a:off x="2796208" y="3485323"/>
-            <a:ext cx="1351721" cy="2309429"/>
+            <a:ext cx="1358347" cy="2570910"/>
           </a:xfrm>
           <a:prstGeom prst="straightConnector1">
             <a:avLst/>
@@ -5859,6 +5942,124 @@
           </a:fontRef>
         </p:style>
       </p:cxnSp>
+      <p:sp>
+        <p:nvSpPr>
+          <p:cNvPr id="36" name="Rectangle 35">
+            <a:extLst>
+              <a:ext uri="{FF2B5EF4-FFF2-40B4-BE49-F238E27FC236}">
+                <a16:creationId xmlns:a16="http://schemas.microsoft.com/office/drawing/2014/main" id="{5DF18D5D-E0E8-4348-A753-36E6C4315E2C}"/>
+              </a:ext>
+            </a:extLst>
+          </p:cNvPr>
+          <p:cNvSpPr/>
+          <p:nvPr/>
+        </p:nvSpPr>
+        <p:spPr>
+          <a:xfrm>
+            <a:off x="8688359" y="4780657"/>
+            <a:ext cx="2227729" cy="543339"/>
+          </a:xfrm>
+          <a:prstGeom prst="rect">
+            <a:avLst/>
+          </a:prstGeom>
+          <a:solidFill>
+            <a:schemeClr val="accent1">
+              <a:lumMod val="40000"/>
+              <a:lumOff val="60000"/>
+            </a:schemeClr>
+          </a:solidFill>
+        </p:spPr>
+        <p:style>
+          <a:lnRef idx="2">
+            <a:schemeClr val="accent1">
+              <a:shade val="50000"/>
+            </a:schemeClr>
+          </a:lnRef>
+          <a:fillRef idx="1">
+            <a:schemeClr val="accent1"/>
+          </a:fillRef>
+          <a:effectRef idx="0">
+            <a:schemeClr val="accent1"/>
+          </a:effectRef>
+          <a:fontRef idx="minor">
+            <a:schemeClr val="lt1"/>
+          </a:fontRef>
+        </p:style>
+        <p:txBody>
+          <a:bodyPr rtlCol="0" anchor="ctr"/>
+          <a:lstStyle/>
+          <a:p>
+            <a:pPr algn="ctr"/>
+            <a:r>
+              <a:rPr lang="en-US" dirty="0">
+                <a:solidFill>
+                  <a:schemeClr val="tx1"/>
+                </a:solidFill>
+              </a:rPr>
+              <a:t>Implementation</a:t>
+            </a:r>
+          </a:p>
+        </p:txBody>
+      </p:sp>
+      <p:sp>
+        <p:nvSpPr>
+          <p:cNvPr id="37" name="Rectangle 36">
+            <a:extLst>
+              <a:ext uri="{FF2B5EF4-FFF2-40B4-BE49-F238E27FC236}">
+                <a16:creationId xmlns:a16="http://schemas.microsoft.com/office/drawing/2014/main" id="{4798F5E6-4B47-FD40-8189-20E83B4058BE}"/>
+              </a:ext>
+            </a:extLst>
+          </p:cNvPr>
+          <p:cNvSpPr/>
+          <p:nvPr/>
+        </p:nvSpPr>
+        <p:spPr>
+          <a:xfrm>
+            <a:off x="8707456" y="5804791"/>
+            <a:ext cx="2227729" cy="543339"/>
+          </a:xfrm>
+          <a:prstGeom prst="rect">
+            <a:avLst/>
+          </a:prstGeom>
+          <a:solidFill>
+            <a:schemeClr val="accent1">
+              <a:lumMod val="40000"/>
+              <a:lumOff val="60000"/>
+            </a:schemeClr>
+          </a:solidFill>
+        </p:spPr>
+        <p:style>
+          <a:lnRef idx="2">
+            <a:schemeClr val="accent1">
+              <a:shade val="50000"/>
+            </a:schemeClr>
+          </a:lnRef>
+          <a:fillRef idx="1">
+            <a:schemeClr val="accent1"/>
+          </a:fillRef>
+          <a:effectRef idx="0">
+            <a:schemeClr val="accent1"/>
+          </a:effectRef>
+          <a:fontRef idx="minor">
+            <a:schemeClr val="lt1"/>
+          </a:fontRef>
+        </p:style>
+        <p:txBody>
+          <a:bodyPr rtlCol="0" anchor="ctr"/>
+          <a:lstStyle/>
+          <a:p>
+            <a:pPr algn="ctr"/>
+            <a:r>
+              <a:rPr lang="en-US" dirty="0">
+                <a:solidFill>
+                  <a:schemeClr val="tx1"/>
+                </a:solidFill>
+              </a:rPr>
+              <a:t>Implementation</a:t>
+            </a:r>
+          </a:p>
+        </p:txBody>
+      </p:sp>
     </p:spTree>
     <p:extLst>
       <p:ext uri="{BB962C8B-B14F-4D97-AF65-F5344CB8AC3E}">
@@ -5891,6 +6092,510 @@
       </p:grpSpPr>
       <p:sp>
         <p:nvSpPr>
+          <p:cNvPr id="68" name="Rectangle 67">
+            <a:extLst>
+              <a:ext uri="{FF2B5EF4-FFF2-40B4-BE49-F238E27FC236}">
+                <a16:creationId xmlns:a16="http://schemas.microsoft.com/office/drawing/2014/main" id="{FDB9BF48-E2A6-964F-A377-7CD2F361633F}"/>
+              </a:ext>
+            </a:extLst>
+          </p:cNvPr>
+          <p:cNvSpPr/>
+          <p:nvPr/>
+        </p:nvSpPr>
+        <p:spPr>
+          <a:xfrm>
+            <a:off x="5599042" y="4652021"/>
+            <a:ext cx="5751443" cy="822324"/>
+          </a:xfrm>
+          <a:prstGeom prst="rect">
+            <a:avLst/>
+          </a:prstGeom>
+        </p:spPr>
+        <p:style>
+          <a:lnRef idx="2">
+            <a:schemeClr val="accent1">
+              <a:shade val="50000"/>
+            </a:schemeClr>
+          </a:lnRef>
+          <a:fillRef idx="1">
+            <a:schemeClr val="accent1"/>
+          </a:fillRef>
+          <a:effectRef idx="0">
+            <a:schemeClr val="accent1"/>
+          </a:effectRef>
+          <a:fontRef idx="minor">
+            <a:schemeClr val="lt1"/>
+          </a:fontRef>
+        </p:style>
+        <p:txBody>
+          <a:bodyPr rtlCol="0" anchor="ctr"/>
+          <a:lstStyle/>
+          <a:p>
+            <a:pPr algn="ctr"/>
+            <a:endParaRPr lang="en-US">
+              <a:solidFill>
+                <a:schemeClr val="tx1"/>
+              </a:solidFill>
+            </a:endParaRPr>
+          </a:p>
+        </p:txBody>
+      </p:sp>
+      <p:sp>
+        <p:nvSpPr>
+          <p:cNvPr id="69" name="Rectangle 68">
+            <a:extLst>
+              <a:ext uri="{FF2B5EF4-FFF2-40B4-BE49-F238E27FC236}">
+                <a16:creationId xmlns:a16="http://schemas.microsoft.com/office/drawing/2014/main" id="{D65F5768-17E4-8F42-AC36-EDFAB89DEDF5}"/>
+              </a:ext>
+            </a:extLst>
+          </p:cNvPr>
+          <p:cNvSpPr/>
+          <p:nvPr/>
+        </p:nvSpPr>
+        <p:spPr>
+          <a:xfrm>
+            <a:off x="5599043" y="5600797"/>
+            <a:ext cx="5751443" cy="879518"/>
+          </a:xfrm>
+          <a:prstGeom prst="rect">
+            <a:avLst/>
+          </a:prstGeom>
+        </p:spPr>
+        <p:style>
+          <a:lnRef idx="2">
+            <a:schemeClr val="accent1">
+              <a:shade val="50000"/>
+            </a:schemeClr>
+          </a:lnRef>
+          <a:fillRef idx="1">
+            <a:schemeClr val="accent1"/>
+          </a:fillRef>
+          <a:effectRef idx="0">
+            <a:schemeClr val="accent1"/>
+          </a:effectRef>
+          <a:fontRef idx="minor">
+            <a:schemeClr val="lt1"/>
+          </a:fontRef>
+        </p:style>
+        <p:txBody>
+          <a:bodyPr rtlCol="0" anchor="ctr"/>
+          <a:lstStyle/>
+          <a:p>
+            <a:pPr algn="ctr"/>
+            <a:endParaRPr lang="en-US">
+              <a:solidFill>
+                <a:schemeClr val="tx1"/>
+              </a:solidFill>
+            </a:endParaRPr>
+          </a:p>
+        </p:txBody>
+      </p:sp>
+      <p:sp>
+        <p:nvSpPr>
+          <p:cNvPr id="70" name="Rectangle 69">
+            <a:extLst>
+              <a:ext uri="{FF2B5EF4-FFF2-40B4-BE49-F238E27FC236}">
+                <a16:creationId xmlns:a16="http://schemas.microsoft.com/office/drawing/2014/main" id="{69223B7A-BBCC-4046-80E2-B5CD74BE8C6F}"/>
+              </a:ext>
+            </a:extLst>
+          </p:cNvPr>
+          <p:cNvSpPr/>
+          <p:nvPr/>
+        </p:nvSpPr>
+        <p:spPr>
+          <a:xfrm>
+            <a:off x="5599043" y="3709729"/>
+            <a:ext cx="5751443" cy="821838"/>
+          </a:xfrm>
+          <a:prstGeom prst="rect">
+            <a:avLst/>
+          </a:prstGeom>
+        </p:spPr>
+        <p:style>
+          <a:lnRef idx="2">
+            <a:schemeClr val="accent1">
+              <a:shade val="50000"/>
+            </a:schemeClr>
+          </a:lnRef>
+          <a:fillRef idx="1">
+            <a:schemeClr val="accent1"/>
+          </a:fillRef>
+          <a:effectRef idx="0">
+            <a:schemeClr val="accent1"/>
+          </a:effectRef>
+          <a:fontRef idx="minor">
+            <a:schemeClr val="lt1"/>
+          </a:fontRef>
+        </p:style>
+        <p:txBody>
+          <a:bodyPr rtlCol="0" anchor="ctr"/>
+          <a:lstStyle/>
+          <a:p>
+            <a:pPr algn="ctr"/>
+            <a:endParaRPr lang="en-US">
+              <a:solidFill>
+                <a:schemeClr val="tx1"/>
+              </a:solidFill>
+            </a:endParaRPr>
+          </a:p>
+        </p:txBody>
+      </p:sp>
+      <p:sp>
+        <p:nvSpPr>
+          <p:cNvPr id="71" name="Rectangle 70">
+            <a:extLst>
+              <a:ext uri="{FF2B5EF4-FFF2-40B4-BE49-F238E27FC236}">
+                <a16:creationId xmlns:a16="http://schemas.microsoft.com/office/drawing/2014/main" id="{103226CA-8A33-E749-BEA2-13D66486FC4A}"/>
+              </a:ext>
+            </a:extLst>
+          </p:cNvPr>
+          <p:cNvSpPr/>
+          <p:nvPr/>
+        </p:nvSpPr>
+        <p:spPr>
+          <a:xfrm>
+            <a:off x="6076902" y="3858890"/>
+            <a:ext cx="2227729" cy="543339"/>
+          </a:xfrm>
+          <a:prstGeom prst="rect">
+            <a:avLst/>
+          </a:prstGeom>
+          <a:solidFill>
+            <a:schemeClr val="accent1">
+              <a:lumMod val="40000"/>
+              <a:lumOff val="60000"/>
+            </a:schemeClr>
+          </a:solidFill>
+        </p:spPr>
+        <p:style>
+          <a:lnRef idx="2">
+            <a:schemeClr val="accent1">
+              <a:shade val="50000"/>
+            </a:schemeClr>
+          </a:lnRef>
+          <a:fillRef idx="1">
+            <a:schemeClr val="accent1"/>
+          </a:fillRef>
+          <a:effectRef idx="0">
+            <a:schemeClr val="accent1"/>
+          </a:effectRef>
+          <a:fontRef idx="minor">
+            <a:schemeClr val="lt1"/>
+          </a:fontRef>
+        </p:style>
+        <p:txBody>
+          <a:bodyPr rtlCol="0" anchor="ctr"/>
+          <a:lstStyle/>
+          <a:p>
+            <a:pPr algn="ctr"/>
+            <a:r>
+              <a:rPr lang="en-US" dirty="0">
+                <a:solidFill>
+                  <a:schemeClr val="tx1"/>
+                </a:solidFill>
+              </a:rPr>
+              <a:t>Resource D</a:t>
+            </a:r>
+          </a:p>
+        </p:txBody>
+      </p:sp>
+      <p:sp>
+        <p:nvSpPr>
+          <p:cNvPr id="72" name="Rectangle 71">
+            <a:extLst>
+              <a:ext uri="{FF2B5EF4-FFF2-40B4-BE49-F238E27FC236}">
+                <a16:creationId xmlns:a16="http://schemas.microsoft.com/office/drawing/2014/main" id="{D6465FBD-98E5-3245-BC27-3371EE66A487}"/>
+              </a:ext>
+            </a:extLst>
+          </p:cNvPr>
+          <p:cNvSpPr/>
+          <p:nvPr/>
+        </p:nvSpPr>
+        <p:spPr>
+          <a:xfrm>
+            <a:off x="6096000" y="5785004"/>
+            <a:ext cx="2227729" cy="543339"/>
+          </a:xfrm>
+          <a:prstGeom prst="rect">
+            <a:avLst/>
+          </a:prstGeom>
+          <a:solidFill>
+            <a:schemeClr val="accent1">
+              <a:lumMod val="40000"/>
+              <a:lumOff val="60000"/>
+            </a:schemeClr>
+          </a:solidFill>
+        </p:spPr>
+        <p:style>
+          <a:lnRef idx="2">
+            <a:schemeClr val="accent1">
+              <a:shade val="50000"/>
+            </a:schemeClr>
+          </a:lnRef>
+          <a:fillRef idx="1">
+            <a:schemeClr val="accent1"/>
+          </a:fillRef>
+          <a:effectRef idx="0">
+            <a:schemeClr val="accent1"/>
+          </a:effectRef>
+          <a:fontRef idx="minor">
+            <a:schemeClr val="lt1"/>
+          </a:fontRef>
+        </p:style>
+        <p:txBody>
+          <a:bodyPr rtlCol="0" anchor="ctr"/>
+          <a:lstStyle/>
+          <a:p>
+            <a:pPr algn="ctr"/>
+            <a:r>
+              <a:rPr lang="en-US" dirty="0">
+                <a:solidFill>
+                  <a:schemeClr val="tx1"/>
+                </a:solidFill>
+              </a:rPr>
+              <a:t>Resource F</a:t>
+            </a:r>
+          </a:p>
+        </p:txBody>
+      </p:sp>
+      <p:sp>
+        <p:nvSpPr>
+          <p:cNvPr id="73" name="Rectangle 72">
+            <a:extLst>
+              <a:ext uri="{FF2B5EF4-FFF2-40B4-BE49-F238E27FC236}">
+                <a16:creationId xmlns:a16="http://schemas.microsoft.com/office/drawing/2014/main" id="{3EA32277-052E-F148-8429-A9BC095C9C10}"/>
+              </a:ext>
+            </a:extLst>
+          </p:cNvPr>
+          <p:cNvSpPr/>
+          <p:nvPr/>
+        </p:nvSpPr>
+        <p:spPr>
+          <a:xfrm>
+            <a:off x="6076902" y="4809732"/>
+            <a:ext cx="2227729" cy="543339"/>
+          </a:xfrm>
+          <a:prstGeom prst="rect">
+            <a:avLst/>
+          </a:prstGeom>
+          <a:solidFill>
+            <a:schemeClr val="accent1">
+              <a:lumMod val="40000"/>
+              <a:lumOff val="60000"/>
+            </a:schemeClr>
+          </a:solidFill>
+        </p:spPr>
+        <p:style>
+          <a:lnRef idx="2">
+            <a:schemeClr val="accent1">
+              <a:shade val="50000"/>
+            </a:schemeClr>
+          </a:lnRef>
+          <a:fillRef idx="1">
+            <a:schemeClr val="accent1"/>
+          </a:fillRef>
+          <a:effectRef idx="0">
+            <a:schemeClr val="accent1"/>
+          </a:effectRef>
+          <a:fontRef idx="minor">
+            <a:schemeClr val="lt1"/>
+          </a:fontRef>
+        </p:style>
+        <p:txBody>
+          <a:bodyPr rtlCol="0" anchor="ctr"/>
+          <a:lstStyle/>
+          <a:p>
+            <a:pPr algn="ctr"/>
+            <a:r>
+              <a:rPr lang="en-US" dirty="0">
+                <a:solidFill>
+                  <a:schemeClr val="tx1"/>
+                </a:solidFill>
+              </a:rPr>
+              <a:t>Resource E</a:t>
+            </a:r>
+          </a:p>
+        </p:txBody>
+      </p:sp>
+      <p:sp>
+        <p:nvSpPr>
+          <p:cNvPr id="74" name="Rectangle 73">
+            <a:extLst>
+              <a:ext uri="{FF2B5EF4-FFF2-40B4-BE49-F238E27FC236}">
+                <a16:creationId xmlns:a16="http://schemas.microsoft.com/office/drawing/2014/main" id="{6CD5E8DE-B6F6-3640-B641-806D818C4A31}"/>
+              </a:ext>
+            </a:extLst>
+          </p:cNvPr>
+          <p:cNvSpPr/>
+          <p:nvPr/>
+        </p:nvSpPr>
+        <p:spPr>
+          <a:xfrm>
+            <a:off x="8707458" y="3858890"/>
+            <a:ext cx="2227729" cy="543339"/>
+          </a:xfrm>
+          <a:prstGeom prst="rect">
+            <a:avLst/>
+          </a:prstGeom>
+          <a:solidFill>
+            <a:schemeClr val="accent1">
+              <a:lumMod val="40000"/>
+              <a:lumOff val="60000"/>
+            </a:schemeClr>
+          </a:solidFill>
+        </p:spPr>
+        <p:style>
+          <a:lnRef idx="2">
+            <a:schemeClr val="accent1">
+              <a:shade val="50000"/>
+            </a:schemeClr>
+          </a:lnRef>
+          <a:fillRef idx="1">
+            <a:schemeClr val="accent1"/>
+          </a:fillRef>
+          <a:effectRef idx="0">
+            <a:schemeClr val="accent1"/>
+          </a:effectRef>
+          <a:fontRef idx="minor">
+            <a:schemeClr val="lt1"/>
+          </a:fontRef>
+        </p:style>
+        <p:txBody>
+          <a:bodyPr rtlCol="0" anchor="ctr"/>
+          <a:lstStyle/>
+          <a:p>
+            <a:pPr algn="ctr"/>
+            <a:r>
+              <a:rPr lang="en-US" dirty="0">
+                <a:solidFill>
+                  <a:schemeClr val="tx1"/>
+                </a:solidFill>
+              </a:rPr>
+              <a:t>Implementation</a:t>
+            </a:r>
+          </a:p>
+        </p:txBody>
+      </p:sp>
+      <p:sp>
+        <p:nvSpPr>
+          <p:cNvPr id="75" name="Rectangle 74">
+            <a:extLst>
+              <a:ext uri="{FF2B5EF4-FFF2-40B4-BE49-F238E27FC236}">
+                <a16:creationId xmlns:a16="http://schemas.microsoft.com/office/drawing/2014/main" id="{DE9AE2C8-4B7E-7743-9B33-64511DF18AC3}"/>
+              </a:ext>
+            </a:extLst>
+          </p:cNvPr>
+          <p:cNvSpPr/>
+          <p:nvPr/>
+        </p:nvSpPr>
+        <p:spPr>
+          <a:xfrm>
+            <a:off x="8688359" y="4780657"/>
+            <a:ext cx="2227729" cy="543339"/>
+          </a:xfrm>
+          <a:prstGeom prst="rect">
+            <a:avLst/>
+          </a:prstGeom>
+          <a:solidFill>
+            <a:schemeClr val="accent1">
+              <a:lumMod val="40000"/>
+              <a:lumOff val="60000"/>
+            </a:schemeClr>
+          </a:solidFill>
+        </p:spPr>
+        <p:style>
+          <a:lnRef idx="2">
+            <a:schemeClr val="accent1">
+              <a:shade val="50000"/>
+            </a:schemeClr>
+          </a:lnRef>
+          <a:fillRef idx="1">
+            <a:schemeClr val="accent1"/>
+          </a:fillRef>
+          <a:effectRef idx="0">
+            <a:schemeClr val="accent1"/>
+          </a:effectRef>
+          <a:fontRef idx="minor">
+            <a:schemeClr val="lt1"/>
+          </a:fontRef>
+        </p:style>
+        <p:txBody>
+          <a:bodyPr rtlCol="0" anchor="ctr"/>
+          <a:lstStyle/>
+          <a:p>
+            <a:pPr algn="ctr"/>
+            <a:r>
+              <a:rPr lang="en-US" dirty="0">
+                <a:solidFill>
+                  <a:schemeClr val="tx1"/>
+                </a:solidFill>
+              </a:rPr>
+              <a:t>Implementation</a:t>
+            </a:r>
+          </a:p>
+        </p:txBody>
+      </p:sp>
+      <p:sp>
+        <p:nvSpPr>
+          <p:cNvPr id="76" name="Rectangle 75">
+            <a:extLst>
+              <a:ext uri="{FF2B5EF4-FFF2-40B4-BE49-F238E27FC236}">
+                <a16:creationId xmlns:a16="http://schemas.microsoft.com/office/drawing/2014/main" id="{28ECB442-9C19-704D-B777-64FFE334599E}"/>
+              </a:ext>
+            </a:extLst>
+          </p:cNvPr>
+          <p:cNvSpPr/>
+          <p:nvPr/>
+        </p:nvSpPr>
+        <p:spPr>
+          <a:xfrm>
+            <a:off x="8707456" y="5804791"/>
+            <a:ext cx="2227729" cy="543339"/>
+          </a:xfrm>
+          <a:prstGeom prst="rect">
+            <a:avLst/>
+          </a:prstGeom>
+          <a:solidFill>
+            <a:schemeClr val="accent1">
+              <a:lumMod val="40000"/>
+              <a:lumOff val="60000"/>
+            </a:schemeClr>
+          </a:solidFill>
+        </p:spPr>
+        <p:style>
+          <a:lnRef idx="2">
+            <a:schemeClr val="accent1">
+              <a:shade val="50000"/>
+            </a:schemeClr>
+          </a:lnRef>
+          <a:fillRef idx="1">
+            <a:schemeClr val="accent1"/>
+          </a:fillRef>
+          <a:effectRef idx="0">
+            <a:schemeClr val="accent1"/>
+          </a:effectRef>
+          <a:fontRef idx="minor">
+            <a:schemeClr val="lt1"/>
+          </a:fontRef>
+        </p:style>
+        <p:txBody>
+          <a:bodyPr rtlCol="0" anchor="ctr"/>
+          <a:lstStyle/>
+          <a:p>
+            <a:pPr algn="ctr"/>
+            <a:r>
+              <a:rPr lang="en-US" dirty="0">
+                <a:solidFill>
+                  <a:schemeClr val="tx1"/>
+                </a:solidFill>
+              </a:rPr>
+              <a:t>Implementation</a:t>
+            </a:r>
+          </a:p>
+        </p:txBody>
+      </p:sp>
+      <p:sp>
+        <p:nvSpPr>
           <p:cNvPr id="6" name="Rectangle 5">
             <a:extLst>
               <a:ext uri="{FF2B5EF4-FFF2-40B4-BE49-F238E27FC236}">
@@ -5931,10 +6636,7 @@
           <a:lstStyle/>
           <a:p>
             <a:pPr algn="ctr"/>
-            <a:r>
-              <a:rPr lang="en-US" dirty="0"/>
-              <a:t>Hypermedia API</a:t>
-            </a:r>
+            <a:endParaRPr lang="en-US" dirty="0"/>
           </a:p>
         </p:txBody>
       </p:sp>
@@ -6403,233 +7105,6 @@
           </a:fontRef>
         </p:style>
       </p:cxnSp>
-      <p:sp>
-        <p:nvSpPr>
-          <p:cNvPr id="49" name="Rectangle 48">
-            <a:extLst>
-              <a:ext uri="{FF2B5EF4-FFF2-40B4-BE49-F238E27FC236}">
-                <a16:creationId xmlns:a16="http://schemas.microsoft.com/office/drawing/2014/main" id="{6AF72238-15CC-5F44-B93C-2D2DF1BDB10F}"/>
-              </a:ext>
-            </a:extLst>
-          </p:cNvPr>
-          <p:cNvSpPr/>
-          <p:nvPr/>
-        </p:nvSpPr>
-        <p:spPr>
-          <a:xfrm>
-            <a:off x="5599043" y="3709729"/>
-            <a:ext cx="5751443" cy="2764638"/>
-          </a:xfrm>
-          <a:prstGeom prst="rect">
-            <a:avLst/>
-          </a:prstGeom>
-        </p:spPr>
-        <p:style>
-          <a:lnRef idx="2">
-            <a:schemeClr val="accent1">
-              <a:shade val="50000"/>
-            </a:schemeClr>
-          </a:lnRef>
-          <a:fillRef idx="1">
-            <a:schemeClr val="accent1"/>
-          </a:fillRef>
-          <a:effectRef idx="0">
-            <a:schemeClr val="accent1"/>
-          </a:effectRef>
-          <a:fontRef idx="minor">
-            <a:schemeClr val="lt1"/>
-          </a:fontRef>
-        </p:style>
-        <p:txBody>
-          <a:bodyPr rtlCol="0" anchor="ctr"/>
-          <a:lstStyle/>
-          <a:p>
-            <a:pPr algn="ctr"/>
-            <a:endParaRPr lang="en-US">
-              <a:solidFill>
-                <a:schemeClr val="tx1"/>
-              </a:solidFill>
-            </a:endParaRPr>
-          </a:p>
-        </p:txBody>
-      </p:sp>
-      <p:sp>
-        <p:nvSpPr>
-          <p:cNvPr id="50" name="Rectangle 49">
-            <a:extLst>
-              <a:ext uri="{FF2B5EF4-FFF2-40B4-BE49-F238E27FC236}">
-                <a16:creationId xmlns:a16="http://schemas.microsoft.com/office/drawing/2014/main" id="{1E97880C-D309-0141-8F45-14E7B8911AD1}"/>
-              </a:ext>
-            </a:extLst>
-          </p:cNvPr>
-          <p:cNvSpPr/>
-          <p:nvPr/>
-        </p:nvSpPr>
-        <p:spPr>
-          <a:xfrm>
-            <a:off x="6089374" y="4165177"/>
-            <a:ext cx="2227729" cy="543339"/>
-          </a:xfrm>
-          <a:prstGeom prst="rect">
-            <a:avLst/>
-          </a:prstGeom>
-          <a:solidFill>
-            <a:schemeClr val="accent1">
-              <a:lumMod val="40000"/>
-              <a:lumOff val="60000"/>
-            </a:schemeClr>
-          </a:solidFill>
-        </p:spPr>
-        <p:style>
-          <a:lnRef idx="2">
-            <a:schemeClr val="accent1">
-              <a:shade val="50000"/>
-            </a:schemeClr>
-          </a:lnRef>
-          <a:fillRef idx="1">
-            <a:schemeClr val="accent1"/>
-          </a:fillRef>
-          <a:effectRef idx="0">
-            <a:schemeClr val="accent1"/>
-          </a:effectRef>
-          <a:fontRef idx="minor">
-            <a:schemeClr val="lt1"/>
-          </a:fontRef>
-        </p:style>
-        <p:txBody>
-          <a:bodyPr rtlCol="0" anchor="ctr"/>
-          <a:lstStyle/>
-          <a:p>
-            <a:pPr algn="ctr"/>
-            <a:r>
-              <a:rPr lang="en-US" dirty="0">
-                <a:solidFill>
-                  <a:schemeClr val="tx1"/>
-                </a:solidFill>
-              </a:rPr>
-              <a:t>Resource D</a:t>
-            </a:r>
-          </a:p>
-        </p:txBody>
-      </p:sp>
-      <p:sp>
-        <p:nvSpPr>
-          <p:cNvPr id="51" name="Rectangle 50">
-            <a:extLst>
-              <a:ext uri="{FF2B5EF4-FFF2-40B4-BE49-F238E27FC236}">
-                <a16:creationId xmlns:a16="http://schemas.microsoft.com/office/drawing/2014/main" id="{93D2642E-E818-8046-B104-0D44708D02EB}"/>
-              </a:ext>
-            </a:extLst>
-          </p:cNvPr>
-          <p:cNvSpPr/>
-          <p:nvPr/>
-        </p:nvSpPr>
-        <p:spPr>
-          <a:xfrm>
-            <a:off x="6096000" y="5523524"/>
-            <a:ext cx="2227729" cy="543339"/>
-          </a:xfrm>
-          <a:prstGeom prst="rect">
-            <a:avLst/>
-          </a:prstGeom>
-          <a:solidFill>
-            <a:schemeClr val="accent1">
-              <a:lumMod val="40000"/>
-              <a:lumOff val="60000"/>
-            </a:schemeClr>
-          </a:solidFill>
-        </p:spPr>
-        <p:style>
-          <a:lnRef idx="2">
-            <a:schemeClr val="accent1">
-              <a:shade val="50000"/>
-            </a:schemeClr>
-          </a:lnRef>
-          <a:fillRef idx="1">
-            <a:schemeClr val="accent1"/>
-          </a:fillRef>
-          <a:effectRef idx="0">
-            <a:schemeClr val="accent1"/>
-          </a:effectRef>
-          <a:fontRef idx="minor">
-            <a:schemeClr val="lt1"/>
-          </a:fontRef>
-        </p:style>
-        <p:txBody>
-          <a:bodyPr rtlCol="0" anchor="ctr"/>
-          <a:lstStyle/>
-          <a:p>
-            <a:pPr algn="ctr"/>
-            <a:r>
-              <a:rPr lang="en-US" dirty="0">
-                <a:solidFill>
-                  <a:schemeClr val="tx1"/>
-                </a:solidFill>
-              </a:rPr>
-              <a:t>Resource F</a:t>
-            </a:r>
-          </a:p>
-        </p:txBody>
-      </p:sp>
-      <p:sp>
-        <p:nvSpPr>
-          <p:cNvPr id="52" name="Rectangle 51">
-            <a:extLst>
-              <a:ext uri="{FF2B5EF4-FFF2-40B4-BE49-F238E27FC236}">
-                <a16:creationId xmlns:a16="http://schemas.microsoft.com/office/drawing/2014/main" id="{000B2AA0-052B-2648-88B2-0DC5E236CA7C}"/>
-              </a:ext>
-            </a:extLst>
-          </p:cNvPr>
-          <p:cNvSpPr/>
-          <p:nvPr/>
-        </p:nvSpPr>
-        <p:spPr>
-          <a:xfrm>
-            <a:off x="6096000" y="4860916"/>
-            <a:ext cx="2227729" cy="543339"/>
-          </a:xfrm>
-          <a:prstGeom prst="rect">
-            <a:avLst/>
-          </a:prstGeom>
-          <a:solidFill>
-            <a:schemeClr val="accent1">
-              <a:lumMod val="40000"/>
-              <a:lumOff val="60000"/>
-            </a:schemeClr>
-          </a:solidFill>
-        </p:spPr>
-        <p:style>
-          <a:lnRef idx="2">
-            <a:schemeClr val="accent1">
-              <a:shade val="50000"/>
-            </a:schemeClr>
-          </a:lnRef>
-          <a:fillRef idx="1">
-            <a:schemeClr val="accent1"/>
-          </a:fillRef>
-          <a:effectRef idx="0">
-            <a:schemeClr val="accent1"/>
-          </a:effectRef>
-          <a:fontRef idx="minor">
-            <a:schemeClr val="lt1"/>
-          </a:fontRef>
-        </p:style>
-        <p:txBody>
-          <a:bodyPr rtlCol="0" anchor="ctr"/>
-          <a:lstStyle/>
-          <a:p>
-            <a:pPr algn="ctr"/>
-            <a:r>
-              <a:rPr lang="en-US" dirty="0">
-                <a:solidFill>
-                  <a:schemeClr val="tx1"/>
-                </a:solidFill>
-              </a:rPr>
-              <a:t>Resource E</a:t>
-            </a:r>
-          </a:p>
-        </p:txBody>
-      </p:sp>
       <p:cxnSp>
         <p:nvCxnSpPr>
           <p:cNvPr id="53" name="Straight Arrow Connector 52">
@@ -6689,13 +7164,12 @@
           </p:cNvPr>
           <p:cNvCxnSpPr>
             <a:cxnSpLocks/>
-            <a:endCxn id="51" idx="1"/>
           </p:cNvCxnSpPr>
           <p:nvPr/>
         </p:nvCxnSpPr>
         <p:spPr>
           <a:xfrm>
-            <a:off x="4764157" y="5794755"/>
+            <a:off x="4745059" y="6077694"/>
             <a:ext cx="1331843" cy="439"/>
           </a:xfrm>
           <a:prstGeom prst="straightConnector1">
@@ -6737,13 +7211,12 @@
           </p:cNvPr>
           <p:cNvCxnSpPr>
             <a:cxnSpLocks/>
-            <a:endCxn id="50" idx="1"/>
           </p:cNvCxnSpPr>
           <p:nvPr/>
         </p:nvCxnSpPr>
         <p:spPr>
           <a:xfrm>
-            <a:off x="4764157" y="4436847"/>
+            <a:off x="4764157" y="4151537"/>
             <a:ext cx="1325217" cy="0"/>
           </a:xfrm>
           <a:prstGeom prst="straightConnector1">
@@ -6785,7 +7258,6 @@
           </p:cNvPr>
           <p:cNvCxnSpPr>
             <a:cxnSpLocks/>
-            <a:endCxn id="52" idx="1"/>
           </p:cNvCxnSpPr>
           <p:nvPr/>
         </p:nvCxnSpPr>
@@ -6920,10 +7392,10 @@
       </p:cxnSp>
       <p:sp>
         <p:nvSpPr>
-          <p:cNvPr id="28" name="Rectangle 27">
-            <a:extLst>
-              <a:ext uri="{FF2B5EF4-FFF2-40B4-BE49-F238E27FC236}">
-                <a16:creationId xmlns:a16="http://schemas.microsoft.com/office/drawing/2014/main" id="{0332C366-548E-5148-96A8-1F4D2EFDA313}"/>
+          <p:cNvPr id="29" name="Rectangle 28">
+            <a:extLst>
+              <a:ext uri="{FF2B5EF4-FFF2-40B4-BE49-F238E27FC236}">
+                <a16:creationId xmlns:a16="http://schemas.microsoft.com/office/drawing/2014/main" id="{5B466111-263A-DF42-9EA3-42B9F23305F4}"/>
               </a:ext>
             </a:extLst>
           </p:cNvPr>
@@ -6932,7 +7404,7 @@
         </p:nvSpPr>
         <p:spPr>
           <a:xfrm>
-            <a:off x="8719930" y="4165177"/>
+            <a:off x="8716617" y="962341"/>
             <a:ext cx="2227729" cy="1901686"/>
           </a:xfrm>
           <a:prstGeom prst="rect">
@@ -6973,87 +7445,6 @@
                 </a:solidFill>
               </a:rPr>
               <a:t>Implementation</a:t>
-            </a:r>
-          </a:p>
-          <a:p>
-            <a:pPr algn="ctr"/>
-            <a:r>
-              <a:rPr lang="en-US" dirty="0">
-                <a:solidFill>
-                  <a:schemeClr val="tx1"/>
-                </a:solidFill>
-              </a:rPr>
-              <a:t>Details</a:t>
-            </a:r>
-          </a:p>
-        </p:txBody>
-      </p:sp>
-      <p:sp>
-        <p:nvSpPr>
-          <p:cNvPr id="29" name="Rectangle 28">
-            <a:extLst>
-              <a:ext uri="{FF2B5EF4-FFF2-40B4-BE49-F238E27FC236}">
-                <a16:creationId xmlns:a16="http://schemas.microsoft.com/office/drawing/2014/main" id="{5B466111-263A-DF42-9EA3-42B9F23305F4}"/>
-              </a:ext>
-            </a:extLst>
-          </p:cNvPr>
-          <p:cNvSpPr/>
-          <p:nvPr/>
-        </p:nvSpPr>
-        <p:spPr>
-          <a:xfrm>
-            <a:off x="8716617" y="962341"/>
-            <a:ext cx="2227729" cy="1901686"/>
-          </a:xfrm>
-          <a:prstGeom prst="rect">
-            <a:avLst/>
-          </a:prstGeom>
-          <a:solidFill>
-            <a:schemeClr val="accent1">
-              <a:lumMod val="40000"/>
-              <a:lumOff val="60000"/>
-            </a:schemeClr>
-          </a:solidFill>
-        </p:spPr>
-        <p:style>
-          <a:lnRef idx="2">
-            <a:schemeClr val="accent1">
-              <a:shade val="50000"/>
-            </a:schemeClr>
-          </a:lnRef>
-          <a:fillRef idx="1">
-            <a:schemeClr val="accent1"/>
-          </a:fillRef>
-          <a:effectRef idx="0">
-            <a:schemeClr val="accent1"/>
-          </a:effectRef>
-          <a:fontRef idx="minor">
-            <a:schemeClr val="lt1"/>
-          </a:fontRef>
-        </p:style>
-        <p:txBody>
-          <a:bodyPr rtlCol="0" anchor="ctr"/>
-          <a:lstStyle/>
-          <a:p>
-            <a:pPr algn="ctr"/>
-            <a:r>
-              <a:rPr lang="en-US" dirty="0">
-                <a:solidFill>
-                  <a:schemeClr val="tx1"/>
-                </a:solidFill>
-              </a:rPr>
-              <a:t>Implementation</a:t>
-            </a:r>
-          </a:p>
-          <a:p>
-            <a:pPr algn="ctr"/>
-            <a:r>
-              <a:rPr lang="en-US" dirty="0">
-                <a:solidFill>
-                  <a:schemeClr val="tx1"/>
-                </a:solidFill>
-              </a:rPr>
-              <a:t>Details</a:t>
             </a:r>
           </a:p>
         </p:txBody>
@@ -7122,7 +7513,7 @@
         </p:nvCxnSpPr>
         <p:spPr>
           <a:xfrm>
-            <a:off x="4160401" y="4424714"/>
+            <a:off x="4160401" y="4139404"/>
             <a:ext cx="609602" cy="1"/>
           </a:xfrm>
           <a:prstGeom prst="straightConnector1">
@@ -7170,7 +7561,7 @@
         </p:nvCxnSpPr>
         <p:spPr>
           <a:xfrm>
-            <a:off x="4154555" y="5794753"/>
+            <a:off x="4135457" y="6077692"/>
             <a:ext cx="609602" cy="1"/>
           </a:xfrm>
           <a:prstGeom prst="straightConnector1">
@@ -7310,7 +7701,7 @@
         <p:spPr>
           <a:xfrm>
             <a:off x="2796208" y="3485323"/>
-            <a:ext cx="1358347" cy="962537"/>
+            <a:ext cx="1331843" cy="673446"/>
           </a:xfrm>
           <a:prstGeom prst="straightConnector1">
             <a:avLst/>
@@ -7406,7 +7797,7 @@
         <p:spPr>
           <a:xfrm>
             <a:off x="2796208" y="3485323"/>
-            <a:ext cx="1351721" cy="2309429"/>
+            <a:ext cx="1350430" cy="2592368"/>
           </a:xfrm>
           <a:prstGeom prst="straightConnector1">
             <a:avLst/>
@@ -7556,8 +7947,8 @@
         </p:nvSpPr>
         <p:spPr>
           <a:xfrm rot="5400000">
-            <a:off x="7991463" y="4517881"/>
-            <a:ext cx="664921" cy="686069"/>
+            <a:off x="7823565" y="4302643"/>
+            <a:ext cx="973817" cy="686069"/>
           </a:xfrm>
           <a:prstGeom prst="circularArrow">
             <a:avLst/>
@@ -7609,8 +8000,8 @@
         </p:nvSpPr>
         <p:spPr>
           <a:xfrm rot="5400000">
-            <a:off x="8005226" y="5183523"/>
-            <a:ext cx="664921" cy="686069"/>
+            <a:off x="7851686" y="5262105"/>
+            <a:ext cx="945105" cy="686069"/>
           </a:xfrm>
           <a:prstGeom prst="circularArrow">
             <a:avLst/>
@@ -7662,8 +8053,8 @@
         </p:nvSpPr>
         <p:spPr>
           <a:xfrm rot="5400000">
-            <a:off x="7429630" y="3185758"/>
-            <a:ext cx="1816109" cy="686069"/>
+            <a:off x="7555221" y="3046719"/>
+            <a:ext cx="1538031" cy="686069"/>
           </a:xfrm>
           <a:prstGeom prst="circularArrow">
             <a:avLst/>
@@ -7698,6 +8089,46 @@
                 <a:schemeClr val="tx1"/>
               </a:solidFill>
             </a:endParaRPr>
+          </a:p>
+        </p:txBody>
+      </p:sp>
+      <p:sp>
+        <p:nvSpPr>
+          <p:cNvPr id="86" name="TextBox 85">
+            <a:extLst>
+              <a:ext uri="{FF2B5EF4-FFF2-40B4-BE49-F238E27FC236}">
+                <a16:creationId xmlns:a16="http://schemas.microsoft.com/office/drawing/2014/main" id="{8A9BA018-FD67-D448-874E-B12B66ACD589}"/>
+              </a:ext>
+            </a:extLst>
+          </p:cNvPr>
+          <p:cNvSpPr txBox="1"/>
+          <p:nvPr/>
+        </p:nvSpPr>
+        <p:spPr>
+          <a:xfrm rot="16200000">
+            <a:off x="3597150" y="3286135"/>
+            <a:ext cx="1697901" cy="369332"/>
+          </a:xfrm>
+          <a:prstGeom prst="rect">
+            <a:avLst/>
+          </a:prstGeom>
+          <a:noFill/>
+        </p:spPr>
+        <p:txBody>
+          <a:bodyPr wrap="none" rtlCol="0">
+            <a:spAutoFit/>
+          </a:bodyPr>
+          <a:lstStyle/>
+          <a:p>
+            <a:pPr algn="ctr"/>
+            <a:r>
+              <a:rPr lang="en-US" dirty="0">
+                <a:solidFill>
+                  <a:schemeClr val="bg1"/>
+                </a:solidFill>
+              </a:rPr>
+              <a:t>Hypermedia API</a:t>
+            </a:r>
           </a:p>
         </p:txBody>
       </p:sp>
@@ -9476,252 +9907,114 @@
           </a:fontRef>
         </p:style>
       </p:cxnSp>
-      <p:sp>
-        <p:nvSpPr>
-          <p:cNvPr id="49" name="Rectangle 48">
-            <a:extLst>
-              <a:ext uri="{FF2B5EF4-FFF2-40B4-BE49-F238E27FC236}">
-                <a16:creationId xmlns:a16="http://schemas.microsoft.com/office/drawing/2014/main" id="{6AF72238-15CC-5F44-B93C-2D2DF1BDB10F}"/>
-              </a:ext>
-            </a:extLst>
-          </p:cNvPr>
-          <p:cNvSpPr/>
-          <p:nvPr/>
-        </p:nvSpPr>
-        <p:spPr>
-          <a:xfrm>
-            <a:off x="5599043" y="3709729"/>
-            <a:ext cx="5751443" cy="2764638"/>
-          </a:xfrm>
-          <a:prstGeom prst="rect">
-            <a:avLst/>
-          </a:prstGeom>
-        </p:spPr>
-        <p:style>
-          <a:lnRef idx="2">
-            <a:schemeClr val="accent1">
-              <a:shade val="50000"/>
-            </a:schemeClr>
-          </a:lnRef>
-          <a:fillRef idx="1">
-            <a:schemeClr val="accent1"/>
-          </a:fillRef>
-          <a:effectRef idx="0">
-            <a:schemeClr val="accent1"/>
-          </a:effectRef>
-          <a:fontRef idx="minor">
-            <a:schemeClr val="lt1"/>
-          </a:fontRef>
-        </p:style>
-        <p:txBody>
-          <a:bodyPr rtlCol="0" anchor="ctr"/>
-          <a:lstStyle/>
-          <a:p>
-            <a:pPr algn="ctr"/>
-            <a:endParaRPr lang="en-US">
-              <a:solidFill>
-                <a:schemeClr val="tx1"/>
-              </a:solidFill>
-            </a:endParaRPr>
-          </a:p>
-        </p:txBody>
-      </p:sp>
-      <p:sp>
-        <p:nvSpPr>
-          <p:cNvPr id="50" name="Rectangle 49">
-            <a:extLst>
-              <a:ext uri="{FF2B5EF4-FFF2-40B4-BE49-F238E27FC236}">
-                <a16:creationId xmlns:a16="http://schemas.microsoft.com/office/drawing/2014/main" id="{1E97880C-D309-0141-8F45-14E7B8911AD1}"/>
-              </a:ext>
-            </a:extLst>
-          </p:cNvPr>
-          <p:cNvSpPr/>
-          <p:nvPr/>
-        </p:nvSpPr>
-        <p:spPr>
-          <a:xfrm>
-            <a:off x="6089374" y="4165177"/>
-            <a:ext cx="2106706" cy="543339"/>
-          </a:xfrm>
-          <a:prstGeom prst="rect">
-            <a:avLst/>
-          </a:prstGeom>
-          <a:solidFill>
-            <a:schemeClr val="accent1">
-              <a:lumMod val="40000"/>
-              <a:lumOff val="60000"/>
-            </a:schemeClr>
-          </a:solidFill>
-        </p:spPr>
-        <p:style>
-          <a:lnRef idx="2">
-            <a:schemeClr val="accent1">
-              <a:shade val="50000"/>
-            </a:schemeClr>
-          </a:lnRef>
-          <a:fillRef idx="1">
-            <a:schemeClr val="accent1"/>
-          </a:fillRef>
-          <a:effectRef idx="0">
-            <a:schemeClr val="accent1"/>
-          </a:effectRef>
-          <a:fontRef idx="minor">
-            <a:schemeClr val="lt1"/>
-          </a:fontRef>
-        </p:style>
-        <p:txBody>
-          <a:bodyPr rtlCol="0" anchor="ctr"/>
-          <a:lstStyle/>
-          <a:p>
-            <a:pPr algn="ctr"/>
-            <a:r>
-              <a:rPr lang="en-US" dirty="0">
-                <a:solidFill>
-                  <a:schemeClr val="tx1"/>
-                </a:solidFill>
-              </a:rPr>
-              <a:t>Event D</a:t>
-            </a:r>
-          </a:p>
-        </p:txBody>
-      </p:sp>
-      <p:sp>
-        <p:nvSpPr>
-          <p:cNvPr id="51" name="Rectangle 50">
-            <a:extLst>
-              <a:ext uri="{FF2B5EF4-FFF2-40B4-BE49-F238E27FC236}">
-                <a16:creationId xmlns:a16="http://schemas.microsoft.com/office/drawing/2014/main" id="{93D2642E-E818-8046-B104-0D44708D02EB}"/>
-              </a:ext>
-            </a:extLst>
-          </p:cNvPr>
-          <p:cNvSpPr/>
-          <p:nvPr/>
-        </p:nvSpPr>
-        <p:spPr>
-          <a:xfrm>
-            <a:off x="6096000" y="5523524"/>
-            <a:ext cx="2106706" cy="543339"/>
-          </a:xfrm>
-          <a:prstGeom prst="rect">
-            <a:avLst/>
-          </a:prstGeom>
-          <a:solidFill>
-            <a:schemeClr val="accent1">
-              <a:lumMod val="40000"/>
-              <a:lumOff val="60000"/>
-            </a:schemeClr>
-          </a:solidFill>
-        </p:spPr>
-        <p:style>
-          <a:lnRef idx="2">
-            <a:schemeClr val="accent1">
-              <a:shade val="50000"/>
-            </a:schemeClr>
-          </a:lnRef>
-          <a:fillRef idx="1">
-            <a:schemeClr val="accent1"/>
-          </a:fillRef>
-          <a:effectRef idx="0">
-            <a:schemeClr val="accent1"/>
-          </a:effectRef>
-          <a:fontRef idx="minor">
-            <a:schemeClr val="lt1"/>
-          </a:fontRef>
-        </p:style>
-        <p:txBody>
-          <a:bodyPr rtlCol="0" anchor="ctr"/>
-          <a:lstStyle/>
-          <a:p>
-            <a:pPr algn="ctr"/>
-            <a:r>
-              <a:rPr lang="en-US" dirty="0">
-                <a:solidFill>
-                  <a:schemeClr val="tx1"/>
-                </a:solidFill>
-              </a:rPr>
-              <a:t>Event F</a:t>
-            </a:r>
-          </a:p>
-        </p:txBody>
-      </p:sp>
-      <p:sp>
-        <p:nvSpPr>
-          <p:cNvPr id="52" name="Rectangle 51">
-            <a:extLst>
-              <a:ext uri="{FF2B5EF4-FFF2-40B4-BE49-F238E27FC236}">
-                <a16:creationId xmlns:a16="http://schemas.microsoft.com/office/drawing/2014/main" id="{000B2AA0-052B-2648-88B2-0DC5E236CA7C}"/>
-              </a:ext>
-            </a:extLst>
-          </p:cNvPr>
-          <p:cNvSpPr/>
-          <p:nvPr/>
-        </p:nvSpPr>
-        <p:spPr>
-          <a:xfrm>
-            <a:off x="6096000" y="4860916"/>
-            <a:ext cx="2106706" cy="543339"/>
-          </a:xfrm>
-          <a:prstGeom prst="rect">
-            <a:avLst/>
-          </a:prstGeom>
-          <a:solidFill>
-            <a:schemeClr val="accent1">
-              <a:lumMod val="40000"/>
-              <a:lumOff val="60000"/>
-            </a:schemeClr>
-          </a:solidFill>
-        </p:spPr>
-        <p:style>
-          <a:lnRef idx="2">
-            <a:schemeClr val="accent1">
-              <a:shade val="50000"/>
-            </a:schemeClr>
-          </a:lnRef>
-          <a:fillRef idx="1">
-            <a:schemeClr val="accent1"/>
-          </a:fillRef>
-          <a:effectRef idx="0">
-            <a:schemeClr val="accent1"/>
-          </a:effectRef>
-          <a:fontRef idx="minor">
-            <a:schemeClr val="lt1"/>
-          </a:fontRef>
-        </p:style>
-        <p:txBody>
-          <a:bodyPr rtlCol="0" anchor="ctr"/>
-          <a:lstStyle/>
-          <a:p>
-            <a:pPr algn="ctr"/>
-            <a:r>
-              <a:rPr lang="en-US" dirty="0">
-                <a:solidFill>
-                  <a:schemeClr val="tx1"/>
-                </a:solidFill>
-              </a:rPr>
-              <a:t>Event E</a:t>
-            </a:r>
-          </a:p>
-        </p:txBody>
-      </p:sp>
       <p:cxnSp>
         <p:nvCxnSpPr>
-          <p:cNvPr id="54" name="Straight Arrow Connector 53">
-            <a:extLst>
-              <a:ext uri="{FF2B5EF4-FFF2-40B4-BE49-F238E27FC236}">
-                <a16:creationId xmlns:a16="http://schemas.microsoft.com/office/drawing/2014/main" id="{4C4C259D-CF2A-F047-96BB-9D10D4A1C310}"/>
+          <p:cNvPr id="59" name="Straight Arrow Connector 58">
+            <a:extLst>
+              <a:ext uri="{FF2B5EF4-FFF2-40B4-BE49-F238E27FC236}">
+                <a16:creationId xmlns:a16="http://schemas.microsoft.com/office/drawing/2014/main" id="{14537642-D60C-E446-95A3-B4FA5DAF8E4A}"/>
               </a:ext>
             </a:extLst>
           </p:cNvPr>
           <p:cNvCxnSpPr>
             <a:cxnSpLocks/>
-            <a:endCxn id="51" idx="1"/>
           </p:cNvCxnSpPr>
           <p:nvPr/>
         </p:nvCxnSpPr>
         <p:spPr>
-          <a:xfrm>
-            <a:off x="4764157" y="5163279"/>
-            <a:ext cx="1331843" cy="631915"/>
+          <a:xfrm flipV="1">
+            <a:off x="4154556" y="1929458"/>
+            <a:ext cx="609601" cy="1740905"/>
+          </a:xfrm>
+          <a:prstGeom prst="straightConnector1">
+            <a:avLst/>
+          </a:prstGeom>
+          <a:ln w="76200">
+            <a:solidFill>
+              <a:schemeClr val="tx1"/>
+            </a:solidFill>
+            <a:prstDash val="sysDot"/>
+            <a:tailEnd type="none"/>
+          </a:ln>
+        </p:spPr>
+        <p:style>
+          <a:lnRef idx="1">
+            <a:schemeClr val="accent1"/>
+          </a:lnRef>
+          <a:fillRef idx="0">
+            <a:schemeClr val="accent1"/>
+          </a:fillRef>
+          <a:effectRef idx="0">
+            <a:schemeClr val="accent1"/>
+          </a:effectRef>
+          <a:fontRef idx="minor">
+            <a:schemeClr val="tx1"/>
+          </a:fontRef>
+        </p:style>
+      </p:cxnSp>
+      <p:cxnSp>
+        <p:nvCxnSpPr>
+          <p:cNvPr id="62" name="Straight Arrow Connector 61">
+            <a:extLst>
+              <a:ext uri="{FF2B5EF4-FFF2-40B4-BE49-F238E27FC236}">
+                <a16:creationId xmlns:a16="http://schemas.microsoft.com/office/drawing/2014/main" id="{EAB90EB3-DFDC-0A4E-82B3-6DCD0DC3EDC6}"/>
+              </a:ext>
+            </a:extLst>
+          </p:cNvPr>
+          <p:cNvCxnSpPr>
+            <a:cxnSpLocks/>
+          </p:cNvCxnSpPr>
+          <p:nvPr/>
+        </p:nvCxnSpPr>
+        <p:spPr>
+          <a:xfrm>
+            <a:off x="4128051" y="3686635"/>
+            <a:ext cx="636106" cy="1461640"/>
+          </a:xfrm>
+          <a:prstGeom prst="straightConnector1">
+            <a:avLst/>
+          </a:prstGeom>
+          <a:ln w="76200">
+            <a:solidFill>
+              <a:schemeClr val="tx1"/>
+            </a:solidFill>
+            <a:prstDash val="sysDot"/>
+            <a:tailEnd type="none"/>
+          </a:ln>
+        </p:spPr>
+        <p:style>
+          <a:lnRef idx="1">
+            <a:schemeClr val="accent1"/>
+          </a:lnRef>
+          <a:fillRef idx="0">
+            <a:schemeClr val="accent1"/>
+          </a:fillRef>
+          <a:effectRef idx="0">
+            <a:schemeClr val="accent1"/>
+          </a:effectRef>
+          <a:fontRef idx="minor">
+            <a:schemeClr val="tx1"/>
+          </a:fontRef>
+        </p:style>
+      </p:cxnSp>
+      <p:cxnSp>
+        <p:nvCxnSpPr>
+          <p:cNvPr id="22" name="Straight Arrow Connector 21">
+            <a:extLst>
+              <a:ext uri="{FF2B5EF4-FFF2-40B4-BE49-F238E27FC236}">
+                <a16:creationId xmlns:a16="http://schemas.microsoft.com/office/drawing/2014/main" id="{83CC9A04-9265-964B-9522-3466C0CEF742}"/>
+              </a:ext>
+            </a:extLst>
+          </p:cNvPr>
+          <p:cNvCxnSpPr>
+            <a:cxnSpLocks/>
+          </p:cNvCxnSpPr>
+          <p:nvPr/>
+        </p:nvCxnSpPr>
+        <p:spPr>
+          <a:xfrm flipH="1">
+            <a:off x="2796208" y="945776"/>
+            <a:ext cx="1351722" cy="2309190"/>
           </a:xfrm>
           <a:prstGeom prst="straightConnector1">
             <a:avLst/>
@@ -9749,25 +10042,635 @@
           </a:fontRef>
         </p:style>
       </p:cxnSp>
+      <p:sp>
+        <p:nvSpPr>
+          <p:cNvPr id="31" name="Rectangle 30">
+            <a:extLst>
+              <a:ext uri="{FF2B5EF4-FFF2-40B4-BE49-F238E27FC236}">
+                <a16:creationId xmlns:a16="http://schemas.microsoft.com/office/drawing/2014/main" id="{6CD83E25-6F5B-484D-8D2C-81E6AC940F13}"/>
+              </a:ext>
+            </a:extLst>
+          </p:cNvPr>
+          <p:cNvSpPr/>
+          <p:nvPr/>
+        </p:nvSpPr>
+        <p:spPr>
+          <a:xfrm>
+            <a:off x="8716617" y="962341"/>
+            <a:ext cx="2227729" cy="1901686"/>
+          </a:xfrm>
+          <a:prstGeom prst="rect">
+            <a:avLst/>
+          </a:prstGeom>
+          <a:solidFill>
+            <a:schemeClr val="accent1">
+              <a:lumMod val="40000"/>
+              <a:lumOff val="60000"/>
+            </a:schemeClr>
+          </a:solidFill>
+        </p:spPr>
+        <p:style>
+          <a:lnRef idx="2">
+            <a:schemeClr val="accent1">
+              <a:shade val="50000"/>
+            </a:schemeClr>
+          </a:lnRef>
+          <a:fillRef idx="1">
+            <a:schemeClr val="accent1"/>
+          </a:fillRef>
+          <a:effectRef idx="0">
+            <a:schemeClr val="accent1"/>
+          </a:effectRef>
+          <a:fontRef idx="minor">
+            <a:schemeClr val="lt1"/>
+          </a:fontRef>
+        </p:style>
+        <p:txBody>
+          <a:bodyPr rtlCol="0" anchor="ctr"/>
+          <a:lstStyle/>
+          <a:p>
+            <a:pPr algn="ctr"/>
+            <a:r>
+              <a:rPr lang="en-US" dirty="0">
+                <a:solidFill>
+                  <a:schemeClr val="tx1"/>
+                </a:solidFill>
+              </a:rPr>
+              <a:t>Implementation</a:t>
+            </a:r>
+          </a:p>
+        </p:txBody>
+      </p:sp>
+      <p:sp>
+        <p:nvSpPr>
+          <p:cNvPr id="38" name="TextBox 37">
+            <a:extLst>
+              <a:ext uri="{FF2B5EF4-FFF2-40B4-BE49-F238E27FC236}">
+                <a16:creationId xmlns:a16="http://schemas.microsoft.com/office/drawing/2014/main" id="{F56B2575-6850-9D44-8D17-EE864E7BF145}"/>
+              </a:ext>
+            </a:extLst>
+          </p:cNvPr>
+          <p:cNvSpPr txBox="1"/>
+          <p:nvPr/>
+        </p:nvSpPr>
+        <p:spPr>
+          <a:xfrm rot="16200000">
+            <a:off x="3326469" y="3286135"/>
+            <a:ext cx="2239267" cy="369332"/>
+          </a:xfrm>
+          <a:prstGeom prst="rect">
+            <a:avLst/>
+          </a:prstGeom>
+          <a:noFill/>
+        </p:spPr>
+        <p:txBody>
+          <a:bodyPr wrap="none" rtlCol="0">
+            <a:spAutoFit/>
+          </a:bodyPr>
+          <a:lstStyle/>
+          <a:p>
+            <a:r>
+              <a:rPr lang="en-US" dirty="0" err="1">
+                <a:solidFill>
+                  <a:schemeClr val="bg1"/>
+                </a:solidFill>
+              </a:rPr>
+              <a:t>PubSub</a:t>
+            </a:r>
+            <a:r>
+              <a:rPr lang="en-US" dirty="0">
+                <a:solidFill>
+                  <a:schemeClr val="bg1"/>
+                </a:solidFill>
+              </a:rPr>
+              <a:t> Infrastructure</a:t>
+            </a:r>
+          </a:p>
+        </p:txBody>
+      </p:sp>
+      <p:sp>
+        <p:nvSpPr>
+          <p:cNvPr id="25" name="Rectangle 24">
+            <a:extLst>
+              <a:ext uri="{FF2B5EF4-FFF2-40B4-BE49-F238E27FC236}">
+                <a16:creationId xmlns:a16="http://schemas.microsoft.com/office/drawing/2014/main" id="{CC75EB76-66FB-7145-8C40-62E7E5EFF247}"/>
+              </a:ext>
+            </a:extLst>
+          </p:cNvPr>
+          <p:cNvSpPr/>
+          <p:nvPr/>
+        </p:nvSpPr>
+        <p:spPr>
+          <a:xfrm>
+            <a:off x="5599042" y="4652021"/>
+            <a:ext cx="5751443" cy="822324"/>
+          </a:xfrm>
+          <a:prstGeom prst="rect">
+            <a:avLst/>
+          </a:prstGeom>
+        </p:spPr>
+        <p:style>
+          <a:lnRef idx="2">
+            <a:schemeClr val="accent1">
+              <a:shade val="50000"/>
+            </a:schemeClr>
+          </a:lnRef>
+          <a:fillRef idx="1">
+            <a:schemeClr val="accent1"/>
+          </a:fillRef>
+          <a:effectRef idx="0">
+            <a:schemeClr val="accent1"/>
+          </a:effectRef>
+          <a:fontRef idx="minor">
+            <a:schemeClr val="lt1"/>
+          </a:fontRef>
+        </p:style>
+        <p:txBody>
+          <a:bodyPr rtlCol="0" anchor="ctr"/>
+          <a:lstStyle/>
+          <a:p>
+            <a:pPr algn="ctr"/>
+            <a:endParaRPr lang="en-US">
+              <a:solidFill>
+                <a:schemeClr val="tx1"/>
+              </a:solidFill>
+            </a:endParaRPr>
+          </a:p>
+        </p:txBody>
+      </p:sp>
+      <p:sp>
+        <p:nvSpPr>
+          <p:cNvPr id="26" name="Rectangle 25">
+            <a:extLst>
+              <a:ext uri="{FF2B5EF4-FFF2-40B4-BE49-F238E27FC236}">
+                <a16:creationId xmlns:a16="http://schemas.microsoft.com/office/drawing/2014/main" id="{CC699434-6B4A-954E-8668-EEA3840D6895}"/>
+              </a:ext>
+            </a:extLst>
+          </p:cNvPr>
+          <p:cNvSpPr/>
+          <p:nvPr/>
+        </p:nvSpPr>
+        <p:spPr>
+          <a:xfrm>
+            <a:off x="5599043" y="5600797"/>
+            <a:ext cx="5751443" cy="879518"/>
+          </a:xfrm>
+          <a:prstGeom prst="rect">
+            <a:avLst/>
+          </a:prstGeom>
+        </p:spPr>
+        <p:style>
+          <a:lnRef idx="2">
+            <a:schemeClr val="accent1">
+              <a:shade val="50000"/>
+            </a:schemeClr>
+          </a:lnRef>
+          <a:fillRef idx="1">
+            <a:schemeClr val="accent1"/>
+          </a:fillRef>
+          <a:effectRef idx="0">
+            <a:schemeClr val="accent1"/>
+          </a:effectRef>
+          <a:fontRef idx="minor">
+            <a:schemeClr val="lt1"/>
+          </a:fontRef>
+        </p:style>
+        <p:txBody>
+          <a:bodyPr rtlCol="0" anchor="ctr"/>
+          <a:lstStyle/>
+          <a:p>
+            <a:pPr algn="ctr"/>
+            <a:endParaRPr lang="en-US">
+              <a:solidFill>
+                <a:schemeClr val="tx1"/>
+              </a:solidFill>
+            </a:endParaRPr>
+          </a:p>
+        </p:txBody>
+      </p:sp>
+      <p:sp>
+        <p:nvSpPr>
+          <p:cNvPr id="27" name="Rectangle 26">
+            <a:extLst>
+              <a:ext uri="{FF2B5EF4-FFF2-40B4-BE49-F238E27FC236}">
+                <a16:creationId xmlns:a16="http://schemas.microsoft.com/office/drawing/2014/main" id="{258E4A31-A6AC-684B-8F8E-0C729A55EC92}"/>
+              </a:ext>
+            </a:extLst>
+          </p:cNvPr>
+          <p:cNvSpPr/>
+          <p:nvPr/>
+        </p:nvSpPr>
+        <p:spPr>
+          <a:xfrm>
+            <a:off x="5599043" y="3709729"/>
+            <a:ext cx="5751443" cy="821838"/>
+          </a:xfrm>
+          <a:prstGeom prst="rect">
+            <a:avLst/>
+          </a:prstGeom>
+        </p:spPr>
+        <p:style>
+          <a:lnRef idx="2">
+            <a:schemeClr val="accent1">
+              <a:shade val="50000"/>
+            </a:schemeClr>
+          </a:lnRef>
+          <a:fillRef idx="1">
+            <a:schemeClr val="accent1"/>
+          </a:fillRef>
+          <a:effectRef idx="0">
+            <a:schemeClr val="accent1"/>
+          </a:effectRef>
+          <a:fontRef idx="minor">
+            <a:schemeClr val="lt1"/>
+          </a:fontRef>
+        </p:style>
+        <p:txBody>
+          <a:bodyPr rtlCol="0" anchor="ctr"/>
+          <a:lstStyle/>
+          <a:p>
+            <a:pPr algn="ctr"/>
+            <a:endParaRPr lang="en-US">
+              <a:solidFill>
+                <a:schemeClr val="tx1"/>
+              </a:solidFill>
+            </a:endParaRPr>
+          </a:p>
+        </p:txBody>
+      </p:sp>
+      <p:sp>
+        <p:nvSpPr>
+          <p:cNvPr id="28" name="Rectangle 27">
+            <a:extLst>
+              <a:ext uri="{FF2B5EF4-FFF2-40B4-BE49-F238E27FC236}">
+                <a16:creationId xmlns:a16="http://schemas.microsoft.com/office/drawing/2014/main" id="{6B74FF20-3F0B-094A-A9B4-E847EED9F391}"/>
+              </a:ext>
+            </a:extLst>
+          </p:cNvPr>
+          <p:cNvSpPr/>
+          <p:nvPr/>
+        </p:nvSpPr>
+        <p:spPr>
+          <a:xfrm>
+            <a:off x="6076902" y="3858890"/>
+            <a:ext cx="2227729" cy="543339"/>
+          </a:xfrm>
+          <a:prstGeom prst="rect">
+            <a:avLst/>
+          </a:prstGeom>
+          <a:solidFill>
+            <a:schemeClr val="accent1">
+              <a:lumMod val="40000"/>
+              <a:lumOff val="60000"/>
+            </a:schemeClr>
+          </a:solidFill>
+        </p:spPr>
+        <p:style>
+          <a:lnRef idx="2">
+            <a:schemeClr val="accent1">
+              <a:shade val="50000"/>
+            </a:schemeClr>
+          </a:lnRef>
+          <a:fillRef idx="1">
+            <a:schemeClr val="accent1"/>
+          </a:fillRef>
+          <a:effectRef idx="0">
+            <a:schemeClr val="accent1"/>
+          </a:effectRef>
+          <a:fontRef idx="minor">
+            <a:schemeClr val="lt1"/>
+          </a:fontRef>
+        </p:style>
+        <p:txBody>
+          <a:bodyPr rtlCol="0" anchor="ctr"/>
+          <a:lstStyle/>
+          <a:p>
+            <a:pPr algn="ctr"/>
+            <a:r>
+              <a:rPr lang="en-US" dirty="0">
+                <a:solidFill>
+                  <a:schemeClr val="tx1"/>
+                </a:solidFill>
+              </a:rPr>
+              <a:t>Event D</a:t>
+            </a:r>
+          </a:p>
+        </p:txBody>
+      </p:sp>
+      <p:sp>
+        <p:nvSpPr>
+          <p:cNvPr id="29" name="Rectangle 28">
+            <a:extLst>
+              <a:ext uri="{FF2B5EF4-FFF2-40B4-BE49-F238E27FC236}">
+                <a16:creationId xmlns:a16="http://schemas.microsoft.com/office/drawing/2014/main" id="{8F3D3150-8BF9-5245-B72C-812D6C4B0A7B}"/>
+              </a:ext>
+            </a:extLst>
+          </p:cNvPr>
+          <p:cNvSpPr/>
+          <p:nvPr/>
+        </p:nvSpPr>
+        <p:spPr>
+          <a:xfrm>
+            <a:off x="6096000" y="5785004"/>
+            <a:ext cx="2227729" cy="543339"/>
+          </a:xfrm>
+          <a:prstGeom prst="rect">
+            <a:avLst/>
+          </a:prstGeom>
+          <a:solidFill>
+            <a:schemeClr val="accent1">
+              <a:lumMod val="40000"/>
+              <a:lumOff val="60000"/>
+            </a:schemeClr>
+          </a:solidFill>
+        </p:spPr>
+        <p:style>
+          <a:lnRef idx="2">
+            <a:schemeClr val="accent1">
+              <a:shade val="50000"/>
+            </a:schemeClr>
+          </a:lnRef>
+          <a:fillRef idx="1">
+            <a:schemeClr val="accent1"/>
+          </a:fillRef>
+          <a:effectRef idx="0">
+            <a:schemeClr val="accent1"/>
+          </a:effectRef>
+          <a:fontRef idx="minor">
+            <a:schemeClr val="lt1"/>
+          </a:fontRef>
+        </p:style>
+        <p:txBody>
+          <a:bodyPr rtlCol="0" anchor="ctr"/>
+          <a:lstStyle/>
+          <a:p>
+            <a:pPr algn="ctr"/>
+            <a:r>
+              <a:rPr lang="en-US" dirty="0">
+                <a:solidFill>
+                  <a:schemeClr val="tx1"/>
+                </a:solidFill>
+              </a:rPr>
+              <a:t>Event F</a:t>
+            </a:r>
+          </a:p>
+        </p:txBody>
+      </p:sp>
+      <p:sp>
+        <p:nvSpPr>
+          <p:cNvPr id="32" name="Rectangle 31">
+            <a:extLst>
+              <a:ext uri="{FF2B5EF4-FFF2-40B4-BE49-F238E27FC236}">
+                <a16:creationId xmlns:a16="http://schemas.microsoft.com/office/drawing/2014/main" id="{0D3AFE55-D3DA-9F4B-A0FF-FF055EE9A934}"/>
+              </a:ext>
+            </a:extLst>
+          </p:cNvPr>
+          <p:cNvSpPr/>
+          <p:nvPr/>
+        </p:nvSpPr>
+        <p:spPr>
+          <a:xfrm>
+            <a:off x="6076902" y="4809732"/>
+            <a:ext cx="2227729" cy="543339"/>
+          </a:xfrm>
+          <a:prstGeom prst="rect">
+            <a:avLst/>
+          </a:prstGeom>
+          <a:solidFill>
+            <a:schemeClr val="accent1">
+              <a:lumMod val="40000"/>
+              <a:lumOff val="60000"/>
+            </a:schemeClr>
+          </a:solidFill>
+        </p:spPr>
+        <p:style>
+          <a:lnRef idx="2">
+            <a:schemeClr val="accent1">
+              <a:shade val="50000"/>
+            </a:schemeClr>
+          </a:lnRef>
+          <a:fillRef idx="1">
+            <a:schemeClr val="accent1"/>
+          </a:fillRef>
+          <a:effectRef idx="0">
+            <a:schemeClr val="accent1"/>
+          </a:effectRef>
+          <a:fontRef idx="minor">
+            <a:schemeClr val="lt1"/>
+          </a:fontRef>
+        </p:style>
+        <p:txBody>
+          <a:bodyPr rtlCol="0" anchor="ctr"/>
+          <a:lstStyle/>
+          <a:p>
+            <a:pPr algn="ctr"/>
+            <a:r>
+              <a:rPr lang="en-US" dirty="0">
+                <a:solidFill>
+                  <a:schemeClr val="tx1"/>
+                </a:solidFill>
+              </a:rPr>
+              <a:t>Event E</a:t>
+            </a:r>
+          </a:p>
+        </p:txBody>
+      </p:sp>
+      <p:sp>
+        <p:nvSpPr>
+          <p:cNvPr id="33" name="Rectangle 32">
+            <a:extLst>
+              <a:ext uri="{FF2B5EF4-FFF2-40B4-BE49-F238E27FC236}">
+                <a16:creationId xmlns:a16="http://schemas.microsoft.com/office/drawing/2014/main" id="{AAA9C8D2-309F-9247-8204-C75FE388A9DF}"/>
+              </a:ext>
+            </a:extLst>
+          </p:cNvPr>
+          <p:cNvSpPr/>
+          <p:nvPr/>
+        </p:nvSpPr>
+        <p:spPr>
+          <a:xfrm>
+            <a:off x="8707458" y="3858890"/>
+            <a:ext cx="2227729" cy="543339"/>
+          </a:xfrm>
+          <a:prstGeom prst="rect">
+            <a:avLst/>
+          </a:prstGeom>
+          <a:solidFill>
+            <a:schemeClr val="accent1">
+              <a:lumMod val="40000"/>
+              <a:lumOff val="60000"/>
+            </a:schemeClr>
+          </a:solidFill>
+        </p:spPr>
+        <p:style>
+          <a:lnRef idx="2">
+            <a:schemeClr val="accent1">
+              <a:shade val="50000"/>
+            </a:schemeClr>
+          </a:lnRef>
+          <a:fillRef idx="1">
+            <a:schemeClr val="accent1"/>
+          </a:fillRef>
+          <a:effectRef idx="0">
+            <a:schemeClr val="accent1"/>
+          </a:effectRef>
+          <a:fontRef idx="minor">
+            <a:schemeClr val="lt1"/>
+          </a:fontRef>
+        </p:style>
+        <p:txBody>
+          <a:bodyPr rtlCol="0" anchor="ctr"/>
+          <a:lstStyle/>
+          <a:p>
+            <a:pPr algn="ctr"/>
+            <a:r>
+              <a:rPr lang="en-US" dirty="0">
+                <a:solidFill>
+                  <a:schemeClr val="tx1"/>
+                </a:solidFill>
+              </a:rPr>
+              <a:t>Implementation</a:t>
+            </a:r>
+          </a:p>
+        </p:txBody>
+      </p:sp>
+      <p:sp>
+        <p:nvSpPr>
+          <p:cNvPr id="34" name="Rectangle 33">
+            <a:extLst>
+              <a:ext uri="{FF2B5EF4-FFF2-40B4-BE49-F238E27FC236}">
+                <a16:creationId xmlns:a16="http://schemas.microsoft.com/office/drawing/2014/main" id="{F17A2383-A861-8745-B546-7DA64FAAC662}"/>
+              </a:ext>
+            </a:extLst>
+          </p:cNvPr>
+          <p:cNvSpPr/>
+          <p:nvPr/>
+        </p:nvSpPr>
+        <p:spPr>
+          <a:xfrm>
+            <a:off x="8688359" y="4780657"/>
+            <a:ext cx="2227729" cy="543339"/>
+          </a:xfrm>
+          <a:prstGeom prst="rect">
+            <a:avLst/>
+          </a:prstGeom>
+          <a:solidFill>
+            <a:schemeClr val="accent1">
+              <a:lumMod val="40000"/>
+              <a:lumOff val="60000"/>
+            </a:schemeClr>
+          </a:solidFill>
+        </p:spPr>
+        <p:style>
+          <a:lnRef idx="2">
+            <a:schemeClr val="accent1">
+              <a:shade val="50000"/>
+            </a:schemeClr>
+          </a:lnRef>
+          <a:fillRef idx="1">
+            <a:schemeClr val="accent1"/>
+          </a:fillRef>
+          <a:effectRef idx="0">
+            <a:schemeClr val="accent1"/>
+          </a:effectRef>
+          <a:fontRef idx="minor">
+            <a:schemeClr val="lt1"/>
+          </a:fontRef>
+        </p:style>
+        <p:txBody>
+          <a:bodyPr rtlCol="0" anchor="ctr"/>
+          <a:lstStyle/>
+          <a:p>
+            <a:pPr algn="ctr"/>
+            <a:r>
+              <a:rPr lang="en-US" dirty="0">
+                <a:solidFill>
+                  <a:schemeClr val="tx1"/>
+                </a:solidFill>
+              </a:rPr>
+              <a:t>Implementation</a:t>
+            </a:r>
+          </a:p>
+        </p:txBody>
+      </p:sp>
+      <p:sp>
+        <p:nvSpPr>
+          <p:cNvPr id="35" name="Rectangle 34">
+            <a:extLst>
+              <a:ext uri="{FF2B5EF4-FFF2-40B4-BE49-F238E27FC236}">
+                <a16:creationId xmlns:a16="http://schemas.microsoft.com/office/drawing/2014/main" id="{CEFBB2C6-DA65-3547-8269-0EEF350B59AF}"/>
+              </a:ext>
+            </a:extLst>
+          </p:cNvPr>
+          <p:cNvSpPr/>
+          <p:nvPr/>
+        </p:nvSpPr>
+        <p:spPr>
+          <a:xfrm>
+            <a:off x="8707456" y="5804791"/>
+            <a:ext cx="2227729" cy="543339"/>
+          </a:xfrm>
+          <a:prstGeom prst="rect">
+            <a:avLst/>
+          </a:prstGeom>
+          <a:solidFill>
+            <a:schemeClr val="accent1">
+              <a:lumMod val="40000"/>
+              <a:lumOff val="60000"/>
+            </a:schemeClr>
+          </a:solidFill>
+        </p:spPr>
+        <p:style>
+          <a:lnRef idx="2">
+            <a:schemeClr val="accent1">
+              <a:shade val="50000"/>
+            </a:schemeClr>
+          </a:lnRef>
+          <a:fillRef idx="1">
+            <a:schemeClr val="accent1"/>
+          </a:fillRef>
+          <a:effectRef idx="0">
+            <a:schemeClr val="accent1"/>
+          </a:effectRef>
+          <a:fontRef idx="minor">
+            <a:schemeClr val="lt1"/>
+          </a:fontRef>
+        </p:style>
+        <p:txBody>
+          <a:bodyPr rtlCol="0" anchor="ctr"/>
+          <a:lstStyle/>
+          <a:p>
+            <a:pPr algn="ctr"/>
+            <a:r>
+              <a:rPr lang="en-US" dirty="0">
+                <a:solidFill>
+                  <a:schemeClr val="tx1"/>
+                </a:solidFill>
+              </a:rPr>
+              <a:t>Implementation</a:t>
+            </a:r>
+          </a:p>
+        </p:txBody>
+      </p:sp>
       <p:cxnSp>
         <p:nvCxnSpPr>
-          <p:cNvPr id="55" name="Straight Arrow Connector 54">
-            <a:extLst>
-              <a:ext uri="{FF2B5EF4-FFF2-40B4-BE49-F238E27FC236}">
-                <a16:creationId xmlns:a16="http://schemas.microsoft.com/office/drawing/2014/main" id="{9B27A2B0-57A9-B64E-8C1E-EA2DFBF4010F}"/>
+          <p:cNvPr id="54" name="Straight Arrow Connector 53">
+            <a:extLst>
+              <a:ext uri="{FF2B5EF4-FFF2-40B4-BE49-F238E27FC236}">
+                <a16:creationId xmlns:a16="http://schemas.microsoft.com/office/drawing/2014/main" id="{4C4C259D-CF2A-F047-96BB-9D10D4A1C310}"/>
               </a:ext>
             </a:extLst>
           </p:cNvPr>
           <p:cNvCxnSpPr>
             <a:cxnSpLocks/>
-            <a:endCxn id="50" idx="1"/>
+            <a:endCxn id="29" idx="1"/>
           </p:cNvCxnSpPr>
           <p:nvPr/>
         </p:nvCxnSpPr>
         <p:spPr>
-          <a:xfrm flipV="1">
-            <a:off x="4744279" y="4436847"/>
-            <a:ext cx="1345095" cy="726432"/>
+          <a:xfrm>
+            <a:off x="4764157" y="5163279"/>
+            <a:ext cx="1331843" cy="893395"/>
           </a:xfrm>
           <a:prstGeom prst="straightConnector1">
             <a:avLst/>
@@ -9797,23 +10700,23 @@
       </p:cxnSp>
       <p:cxnSp>
         <p:nvCxnSpPr>
-          <p:cNvPr id="56" name="Straight Arrow Connector 55">
-            <a:extLst>
-              <a:ext uri="{FF2B5EF4-FFF2-40B4-BE49-F238E27FC236}">
-                <a16:creationId xmlns:a16="http://schemas.microsoft.com/office/drawing/2014/main" id="{68878536-CBBF-CA49-BB3A-7EEB828827CA}"/>
+          <p:cNvPr id="55" name="Straight Arrow Connector 54">
+            <a:extLst>
+              <a:ext uri="{FF2B5EF4-FFF2-40B4-BE49-F238E27FC236}">
+                <a16:creationId xmlns:a16="http://schemas.microsoft.com/office/drawing/2014/main" id="{9B27A2B0-57A9-B64E-8C1E-EA2DFBF4010F}"/>
               </a:ext>
             </a:extLst>
           </p:cNvPr>
           <p:cNvCxnSpPr>
             <a:cxnSpLocks/>
-            <a:endCxn id="52" idx="1"/>
+            <a:endCxn id="28" idx="1"/>
           </p:cNvCxnSpPr>
           <p:nvPr/>
         </p:nvCxnSpPr>
         <p:spPr>
           <a:xfrm flipV="1">
-            <a:off x="4764157" y="5132586"/>
-            <a:ext cx="1331843" cy="15688"/>
+            <a:off x="4744279" y="4130560"/>
+            <a:ext cx="1332623" cy="1032720"/>
           </a:xfrm>
           <a:prstGeom prst="straightConnector1">
             <a:avLst/>
@@ -9843,10 +10746,10 @@
       </p:cxnSp>
       <p:cxnSp>
         <p:nvCxnSpPr>
-          <p:cNvPr id="59" name="Straight Arrow Connector 58">
-            <a:extLst>
-              <a:ext uri="{FF2B5EF4-FFF2-40B4-BE49-F238E27FC236}">
-                <a16:creationId xmlns:a16="http://schemas.microsoft.com/office/drawing/2014/main" id="{14537642-D60C-E446-95A3-B4FA5DAF8E4A}"/>
+          <p:cNvPr id="56" name="Straight Arrow Connector 55">
+            <a:extLst>
+              <a:ext uri="{FF2B5EF4-FFF2-40B4-BE49-F238E27FC236}">
+                <a16:creationId xmlns:a16="http://schemas.microsoft.com/office/drawing/2014/main" id="{68878536-CBBF-CA49-BB3A-7EEB828827CA}"/>
               </a:ext>
             </a:extLst>
           </p:cNvPr>
@@ -9857,98 +10760,8 @@
         </p:nvCxnSpPr>
         <p:spPr>
           <a:xfrm flipV="1">
-            <a:off x="4154556" y="1929458"/>
-            <a:ext cx="609601" cy="1740905"/>
-          </a:xfrm>
-          <a:prstGeom prst="straightConnector1">
-            <a:avLst/>
-          </a:prstGeom>
-          <a:ln w="76200">
-            <a:solidFill>
-              <a:schemeClr val="tx1"/>
-            </a:solidFill>
-            <a:prstDash val="sysDot"/>
-            <a:tailEnd type="none"/>
-          </a:ln>
-        </p:spPr>
-        <p:style>
-          <a:lnRef idx="1">
-            <a:schemeClr val="accent1"/>
-          </a:lnRef>
-          <a:fillRef idx="0">
-            <a:schemeClr val="accent1"/>
-          </a:fillRef>
-          <a:effectRef idx="0">
-            <a:schemeClr val="accent1"/>
-          </a:effectRef>
-          <a:fontRef idx="minor">
-            <a:schemeClr val="tx1"/>
-          </a:fontRef>
-        </p:style>
-      </p:cxnSp>
-      <p:cxnSp>
-        <p:nvCxnSpPr>
-          <p:cNvPr id="62" name="Straight Arrow Connector 61">
-            <a:extLst>
-              <a:ext uri="{FF2B5EF4-FFF2-40B4-BE49-F238E27FC236}">
-                <a16:creationId xmlns:a16="http://schemas.microsoft.com/office/drawing/2014/main" id="{EAB90EB3-DFDC-0A4E-82B3-6DCD0DC3EDC6}"/>
-              </a:ext>
-            </a:extLst>
-          </p:cNvPr>
-          <p:cNvCxnSpPr>
-            <a:cxnSpLocks/>
-          </p:cNvCxnSpPr>
-          <p:nvPr/>
-        </p:nvCxnSpPr>
-        <p:spPr>
-          <a:xfrm>
-            <a:off x="4128051" y="3686635"/>
-            <a:ext cx="636106" cy="1461640"/>
-          </a:xfrm>
-          <a:prstGeom prst="straightConnector1">
-            <a:avLst/>
-          </a:prstGeom>
-          <a:ln w="76200">
-            <a:solidFill>
-              <a:schemeClr val="tx1"/>
-            </a:solidFill>
-            <a:prstDash val="sysDot"/>
-            <a:tailEnd type="none"/>
-          </a:ln>
-        </p:spPr>
-        <p:style>
-          <a:lnRef idx="1">
-            <a:schemeClr val="accent1"/>
-          </a:lnRef>
-          <a:fillRef idx="0">
-            <a:schemeClr val="accent1"/>
-          </a:fillRef>
-          <a:effectRef idx="0">
-            <a:schemeClr val="accent1"/>
-          </a:effectRef>
-          <a:fontRef idx="minor">
-            <a:schemeClr val="tx1"/>
-          </a:fontRef>
-        </p:style>
-      </p:cxnSp>
-      <p:cxnSp>
-        <p:nvCxnSpPr>
-          <p:cNvPr id="22" name="Straight Arrow Connector 21">
-            <a:extLst>
-              <a:ext uri="{FF2B5EF4-FFF2-40B4-BE49-F238E27FC236}">
-                <a16:creationId xmlns:a16="http://schemas.microsoft.com/office/drawing/2014/main" id="{83CC9A04-9265-964B-9522-3466C0CEF742}"/>
-              </a:ext>
-            </a:extLst>
-          </p:cNvPr>
-          <p:cNvCxnSpPr>
-            <a:cxnSpLocks/>
-          </p:cNvCxnSpPr>
-          <p:nvPr/>
-        </p:nvCxnSpPr>
-        <p:spPr>
-          <a:xfrm flipH="1">
-            <a:off x="2796208" y="945776"/>
-            <a:ext cx="1351722" cy="2309190"/>
+            <a:off x="4764157" y="5132586"/>
+            <a:ext cx="1331843" cy="15688"/>
           </a:xfrm>
           <a:prstGeom prst="straightConnector1">
             <a:avLst/>
@@ -9978,150 +10791,10 @@
       </p:cxnSp>
       <p:sp>
         <p:nvSpPr>
-          <p:cNvPr id="30" name="Rectangle 29">
-            <a:extLst>
-              <a:ext uri="{FF2B5EF4-FFF2-40B4-BE49-F238E27FC236}">
-                <a16:creationId xmlns:a16="http://schemas.microsoft.com/office/drawing/2014/main" id="{2084521F-3551-C54E-B121-FF666AB0538C}"/>
-              </a:ext>
-            </a:extLst>
-          </p:cNvPr>
-          <p:cNvSpPr/>
-          <p:nvPr/>
-        </p:nvSpPr>
-        <p:spPr>
-          <a:xfrm>
-            <a:off x="8719930" y="4165177"/>
-            <a:ext cx="2227729" cy="1901686"/>
-          </a:xfrm>
-          <a:prstGeom prst="rect">
-            <a:avLst/>
-          </a:prstGeom>
-          <a:solidFill>
-            <a:schemeClr val="accent1">
-              <a:lumMod val="40000"/>
-              <a:lumOff val="60000"/>
-            </a:schemeClr>
-          </a:solidFill>
-        </p:spPr>
-        <p:style>
-          <a:lnRef idx="2">
-            <a:schemeClr val="accent1">
-              <a:shade val="50000"/>
-            </a:schemeClr>
-          </a:lnRef>
-          <a:fillRef idx="1">
-            <a:schemeClr val="accent1"/>
-          </a:fillRef>
-          <a:effectRef idx="0">
-            <a:schemeClr val="accent1"/>
-          </a:effectRef>
-          <a:fontRef idx="minor">
-            <a:schemeClr val="lt1"/>
-          </a:fontRef>
-        </p:style>
-        <p:txBody>
-          <a:bodyPr rtlCol="0" anchor="ctr"/>
-          <a:lstStyle/>
-          <a:p>
-            <a:pPr algn="ctr"/>
-            <a:r>
-              <a:rPr lang="en-US" dirty="0">
-                <a:solidFill>
-                  <a:schemeClr val="tx1"/>
-                </a:solidFill>
-              </a:rPr>
-              <a:t>Implementation</a:t>
-            </a:r>
-          </a:p>
-          <a:p>
-            <a:pPr algn="ctr"/>
-            <a:r>
-              <a:rPr lang="en-US" dirty="0">
-                <a:solidFill>
-                  <a:schemeClr val="tx1"/>
-                </a:solidFill>
-              </a:rPr>
-              <a:t>Details</a:t>
-            </a:r>
-          </a:p>
-        </p:txBody>
-      </p:sp>
-      <p:sp>
-        <p:nvSpPr>
-          <p:cNvPr id="31" name="Rectangle 30">
-            <a:extLst>
-              <a:ext uri="{FF2B5EF4-FFF2-40B4-BE49-F238E27FC236}">
-                <a16:creationId xmlns:a16="http://schemas.microsoft.com/office/drawing/2014/main" id="{6CD83E25-6F5B-484D-8D2C-81E6AC940F13}"/>
-              </a:ext>
-            </a:extLst>
-          </p:cNvPr>
-          <p:cNvSpPr/>
-          <p:nvPr/>
-        </p:nvSpPr>
-        <p:spPr>
-          <a:xfrm>
-            <a:off x="8716617" y="962341"/>
-            <a:ext cx="2227729" cy="1901686"/>
-          </a:xfrm>
-          <a:prstGeom prst="rect">
-            <a:avLst/>
-          </a:prstGeom>
-          <a:solidFill>
-            <a:schemeClr val="accent1">
-              <a:lumMod val="40000"/>
-              <a:lumOff val="60000"/>
-            </a:schemeClr>
-          </a:solidFill>
-        </p:spPr>
-        <p:style>
-          <a:lnRef idx="2">
-            <a:schemeClr val="accent1">
-              <a:shade val="50000"/>
-            </a:schemeClr>
-          </a:lnRef>
-          <a:fillRef idx="1">
-            <a:schemeClr val="accent1"/>
-          </a:fillRef>
-          <a:effectRef idx="0">
-            <a:schemeClr val="accent1"/>
-          </a:effectRef>
-          <a:fontRef idx="minor">
-            <a:schemeClr val="lt1"/>
-          </a:fontRef>
-        </p:style>
-        <p:txBody>
-          <a:bodyPr rtlCol="0" anchor="ctr"/>
-          <a:lstStyle/>
-          <a:p>
-            <a:pPr algn="ctr"/>
-            <a:r>
-              <a:rPr lang="en-US" dirty="0">
-                <a:solidFill>
-                  <a:schemeClr val="tx1"/>
-                </a:solidFill>
-              </a:rPr>
-              <a:t>Implementation</a:t>
-            </a:r>
-          </a:p>
-          <a:p>
-            <a:pPr algn="ctr"/>
-            <a:r>
-              <a:rPr lang="en-US" dirty="0">
-                <a:solidFill>
-                  <a:schemeClr val="tx1"/>
-                </a:solidFill>
-              </a:rPr>
-              <a:t>Details</a:t>
-            </a:r>
-          </a:p>
-        </p:txBody>
-      </p:sp>
-      <p:sp>
-        <p:nvSpPr>
-          <p:cNvPr id="38" name="TextBox 37">
-            <a:extLst>
-              <a:ext uri="{FF2B5EF4-FFF2-40B4-BE49-F238E27FC236}">
-                <a16:creationId xmlns:a16="http://schemas.microsoft.com/office/drawing/2014/main" id="{F56B2575-6850-9D44-8D17-EE864E7BF145}"/>
+          <p:cNvPr id="19" name="TextBox 18">
+            <a:extLst>
+              <a:ext uri="{FF2B5EF4-FFF2-40B4-BE49-F238E27FC236}">
+                <a16:creationId xmlns:a16="http://schemas.microsoft.com/office/drawing/2014/main" id="{D621FC7A-F103-C344-A503-72A1ED39AE17}"/>
               </a:ext>
             </a:extLst>
           </p:cNvPr>
@@ -10129,9 +10802,9 @@
           <p:nvPr/>
         </p:nvSpPr>
         <p:spPr>
-          <a:xfrm rot="16200000">
-            <a:off x="3600776" y="3286135"/>
-            <a:ext cx="1690656" cy="369332"/>
+          <a:xfrm rot="17998346">
+            <a:off x="2556813" y="1982530"/>
+            <a:ext cx="1347869" cy="369332"/>
           </a:xfrm>
           <a:prstGeom prst="rect">
             <a:avLst/>
@@ -10145,12 +10818,43 @@
           <a:lstStyle/>
           <a:p>
             <a:r>
-              <a:rPr lang="en-US" dirty="0">
-                <a:solidFill>
-                  <a:schemeClr val="bg1"/>
-                </a:solidFill>
-              </a:rPr>
-              <a:t>Event-based API</a:t>
+              <a:rPr lang="en-US" dirty="0"/>
+              <a:t>Subscription</a:t>
+            </a:r>
+          </a:p>
+        </p:txBody>
+      </p:sp>
+      <p:sp>
+        <p:nvSpPr>
+          <p:cNvPr id="21" name="TextBox 20">
+            <a:extLst>
+              <a:ext uri="{FF2B5EF4-FFF2-40B4-BE49-F238E27FC236}">
+                <a16:creationId xmlns:a16="http://schemas.microsoft.com/office/drawing/2014/main" id="{E5DA7961-30A2-174A-8701-45903EC1448B}"/>
+              </a:ext>
+            </a:extLst>
+          </p:cNvPr>
+          <p:cNvSpPr txBox="1"/>
+          <p:nvPr/>
+        </p:nvSpPr>
+        <p:spPr>
+          <a:xfrm>
+            <a:off x="3060066" y="3318180"/>
+            <a:ext cx="951414" cy="369332"/>
+          </a:xfrm>
+          <a:prstGeom prst="rect">
+            <a:avLst/>
+          </a:prstGeom>
+          <a:noFill/>
+        </p:spPr>
+        <p:txBody>
+          <a:bodyPr wrap="none" rtlCol="0">
+            <a:spAutoFit/>
+          </a:bodyPr>
+          <a:lstStyle/>
+          <a:p>
+            <a:r>
+              <a:rPr lang="en-US" dirty="0"/>
+              <a:t>Delivery</a:t>
             </a:r>
           </a:p>
         </p:txBody>

</xml_diff>

<commit_message>
adding BFF image and slide
</commit_message>
<xml_diff>
--- a/modules/img/api-styles.pptx
+++ b/modules/img/api-styles.pptx
@@ -10,6 +10,7 @@
     <p:sldId id="258" r:id="rId4"/>
     <p:sldId id="259" r:id="rId5"/>
     <p:sldId id="260" r:id="rId6"/>
+    <p:sldId id="261" r:id="rId7"/>
   </p:sldIdLst>
   <p:sldSz cx="12192000" cy="6858000"/>
   <p:notesSz cx="6858000" cy="9144000"/>
@@ -263,7 +264,7 @@
           <a:p>
             <a:fld id="{B50B1E95-426A-EB4B-A616-E031B71F156C}" type="datetimeFigureOut">
               <a:rPr lang="en-US" smtClean="0"/>
-              <a:t>7/8/20</a:t>
+              <a:t>8/5/20</a:t>
             </a:fld>
             <a:endParaRPr lang="en-US"/>
           </a:p>
@@ -461,7 +462,7 @@
           <a:p>
             <a:fld id="{B50B1E95-426A-EB4B-A616-E031B71F156C}" type="datetimeFigureOut">
               <a:rPr lang="en-US" smtClean="0"/>
-              <a:t>7/8/20</a:t>
+              <a:t>8/5/20</a:t>
             </a:fld>
             <a:endParaRPr lang="en-US"/>
           </a:p>
@@ -669,7 +670,7 @@
           <a:p>
             <a:fld id="{B50B1E95-426A-EB4B-A616-E031B71F156C}" type="datetimeFigureOut">
               <a:rPr lang="en-US" smtClean="0"/>
-              <a:t>7/8/20</a:t>
+              <a:t>8/5/20</a:t>
             </a:fld>
             <a:endParaRPr lang="en-US"/>
           </a:p>
@@ -867,7 +868,7 @@
           <a:p>
             <a:fld id="{B50B1E95-426A-EB4B-A616-E031B71F156C}" type="datetimeFigureOut">
               <a:rPr lang="en-US" smtClean="0"/>
-              <a:t>7/8/20</a:t>
+              <a:t>8/5/20</a:t>
             </a:fld>
             <a:endParaRPr lang="en-US"/>
           </a:p>
@@ -1142,7 +1143,7 @@
           <a:p>
             <a:fld id="{B50B1E95-426A-EB4B-A616-E031B71F156C}" type="datetimeFigureOut">
               <a:rPr lang="en-US" smtClean="0"/>
-              <a:t>7/8/20</a:t>
+              <a:t>8/5/20</a:t>
             </a:fld>
             <a:endParaRPr lang="en-US"/>
           </a:p>
@@ -1407,7 +1408,7 @@
           <a:p>
             <a:fld id="{B50B1E95-426A-EB4B-A616-E031B71F156C}" type="datetimeFigureOut">
               <a:rPr lang="en-US" smtClean="0"/>
-              <a:t>7/8/20</a:t>
+              <a:t>8/5/20</a:t>
             </a:fld>
             <a:endParaRPr lang="en-US"/>
           </a:p>
@@ -1819,7 +1820,7 @@
           <a:p>
             <a:fld id="{B50B1E95-426A-EB4B-A616-E031B71F156C}" type="datetimeFigureOut">
               <a:rPr lang="en-US" smtClean="0"/>
-              <a:t>7/8/20</a:t>
+              <a:t>8/5/20</a:t>
             </a:fld>
             <a:endParaRPr lang="en-US"/>
           </a:p>
@@ -1960,7 +1961,7 @@
           <a:p>
             <a:fld id="{B50B1E95-426A-EB4B-A616-E031B71F156C}" type="datetimeFigureOut">
               <a:rPr lang="en-US" smtClean="0"/>
-              <a:t>7/8/20</a:t>
+              <a:t>8/5/20</a:t>
             </a:fld>
             <a:endParaRPr lang="en-US"/>
           </a:p>
@@ -2073,7 +2074,7 @@
           <a:p>
             <a:fld id="{B50B1E95-426A-EB4B-A616-E031B71F156C}" type="datetimeFigureOut">
               <a:rPr lang="en-US" smtClean="0"/>
-              <a:t>7/8/20</a:t>
+              <a:t>8/5/20</a:t>
             </a:fld>
             <a:endParaRPr lang="en-US"/>
           </a:p>
@@ -2384,7 +2385,7 @@
           <a:p>
             <a:fld id="{B50B1E95-426A-EB4B-A616-E031B71F156C}" type="datetimeFigureOut">
               <a:rPr lang="en-US" smtClean="0"/>
-              <a:t>7/8/20</a:t>
+              <a:t>8/5/20</a:t>
             </a:fld>
             <a:endParaRPr lang="en-US"/>
           </a:p>
@@ -2672,7 +2673,7 @@
           <a:p>
             <a:fld id="{B50B1E95-426A-EB4B-A616-E031B71F156C}" type="datetimeFigureOut">
               <a:rPr lang="en-US" smtClean="0"/>
-              <a:t>7/8/20</a:t>
+              <a:t>8/5/20</a:t>
             </a:fld>
             <a:endParaRPr lang="en-US"/>
           </a:p>
@@ -2913,7 +2914,7 @@
           <a:p>
             <a:fld id="{B50B1E95-426A-EB4B-A616-E031B71F156C}" type="datetimeFigureOut">
               <a:rPr lang="en-US" smtClean="0"/>
-              <a:t>7/8/20</a:t>
+              <a:t>8/5/20</a:t>
             </a:fld>
             <a:endParaRPr lang="en-US"/>
           </a:p>
@@ -10872,6 +10873,371 @@
 </p:sld>
 </file>
 
+<file path=ppt/slides/slide6.xml><?xml version="1.0" encoding="utf-8"?>
+<p:sld xmlns:a="http://schemas.openxmlformats.org/drawingml/2006/main" xmlns:r="http://schemas.openxmlformats.org/officeDocument/2006/relationships" xmlns:p="http://schemas.openxmlformats.org/presentationml/2006/main">
+  <p:cSld>
+    <p:spTree>
+      <p:nvGrpSpPr>
+        <p:cNvPr id="1" name=""/>
+        <p:cNvGrpSpPr/>
+        <p:nvPr/>
+      </p:nvGrpSpPr>
+      <p:grpSpPr>
+        <a:xfrm>
+          <a:off x="0" y="0"/>
+          <a:ext cx="0" cy="0"/>
+          <a:chOff x="0" y="0"/>
+          <a:chExt cx="0" cy="0"/>
+        </a:xfrm>
+      </p:grpSpPr>
+      <p:sp>
+        <p:nvSpPr>
+          <p:cNvPr id="7" name="Rectangle 6">
+            <a:extLst>
+              <a:ext uri="{FF2B5EF4-FFF2-40B4-BE49-F238E27FC236}">
+                <a16:creationId xmlns:a16="http://schemas.microsoft.com/office/drawing/2014/main" id="{A0950097-100D-A246-8719-4B894DDB761D}"/>
+              </a:ext>
+            </a:extLst>
+          </p:cNvPr>
+          <p:cNvSpPr/>
+          <p:nvPr/>
+        </p:nvSpPr>
+        <p:spPr>
+          <a:xfrm>
+            <a:off x="4592726" y="4220355"/>
+            <a:ext cx="3006548" cy="954157"/>
+          </a:xfrm>
+          <a:prstGeom prst="rect">
+            <a:avLst/>
+          </a:prstGeom>
+        </p:spPr>
+        <p:style>
+          <a:lnRef idx="2">
+            <a:schemeClr val="accent1">
+              <a:shade val="50000"/>
+            </a:schemeClr>
+          </a:lnRef>
+          <a:fillRef idx="1">
+            <a:schemeClr val="accent1"/>
+          </a:fillRef>
+          <a:effectRef idx="0">
+            <a:schemeClr val="accent1"/>
+          </a:effectRef>
+          <a:fontRef idx="minor">
+            <a:schemeClr val="lt1"/>
+          </a:fontRef>
+        </p:style>
+        <p:txBody>
+          <a:bodyPr rtlCol="0" anchor="ctr"/>
+          <a:lstStyle/>
+          <a:p>
+            <a:pPr algn="ctr"/>
+            <a:r>
+              <a:rPr lang="en-US" dirty="0"/>
+              <a:t>Facebook GraphQL API</a:t>
+            </a:r>
+          </a:p>
+        </p:txBody>
+      </p:sp>
+      <p:sp>
+        <p:nvSpPr>
+          <p:cNvPr id="36" name="Rectangle 35">
+            <a:extLst>
+              <a:ext uri="{FF2B5EF4-FFF2-40B4-BE49-F238E27FC236}">
+                <a16:creationId xmlns:a16="http://schemas.microsoft.com/office/drawing/2014/main" id="{CD20A5FB-FFE7-F247-87E6-C0138FA179D5}"/>
+              </a:ext>
+            </a:extLst>
+          </p:cNvPr>
+          <p:cNvSpPr/>
+          <p:nvPr/>
+        </p:nvSpPr>
+        <p:spPr>
+          <a:xfrm>
+            <a:off x="2257955" y="1814235"/>
+            <a:ext cx="2001078" cy="954157"/>
+          </a:xfrm>
+          <a:prstGeom prst="rect">
+            <a:avLst/>
+          </a:prstGeom>
+        </p:spPr>
+        <p:style>
+          <a:lnRef idx="2">
+            <a:schemeClr val="accent1">
+              <a:shade val="50000"/>
+            </a:schemeClr>
+          </a:lnRef>
+          <a:fillRef idx="1">
+            <a:schemeClr val="accent1"/>
+          </a:fillRef>
+          <a:effectRef idx="0">
+            <a:schemeClr val="accent1"/>
+          </a:effectRef>
+          <a:fontRef idx="minor">
+            <a:schemeClr val="lt1"/>
+          </a:fontRef>
+        </p:style>
+        <p:txBody>
+          <a:bodyPr rtlCol="0" anchor="ctr"/>
+          <a:lstStyle/>
+          <a:p>
+            <a:pPr algn="ctr"/>
+            <a:r>
+              <a:rPr lang="en-US" dirty="0"/>
+              <a:t>iOS App</a:t>
+            </a:r>
+          </a:p>
+        </p:txBody>
+      </p:sp>
+      <p:sp>
+        <p:nvSpPr>
+          <p:cNvPr id="37" name="Rectangle 36">
+            <a:extLst>
+              <a:ext uri="{FF2B5EF4-FFF2-40B4-BE49-F238E27FC236}">
+                <a16:creationId xmlns:a16="http://schemas.microsoft.com/office/drawing/2014/main" id="{A3BA6B70-D4C8-6C47-B65D-C5258756137F}"/>
+              </a:ext>
+            </a:extLst>
+          </p:cNvPr>
+          <p:cNvSpPr/>
+          <p:nvPr/>
+        </p:nvSpPr>
+        <p:spPr>
+          <a:xfrm>
+            <a:off x="5095461" y="1814235"/>
+            <a:ext cx="2001078" cy="954157"/>
+          </a:xfrm>
+          <a:prstGeom prst="rect">
+            <a:avLst/>
+          </a:prstGeom>
+        </p:spPr>
+        <p:style>
+          <a:lnRef idx="2">
+            <a:schemeClr val="accent1">
+              <a:shade val="50000"/>
+            </a:schemeClr>
+          </a:lnRef>
+          <a:fillRef idx="1">
+            <a:schemeClr val="accent1"/>
+          </a:fillRef>
+          <a:effectRef idx="0">
+            <a:schemeClr val="accent1"/>
+          </a:effectRef>
+          <a:fontRef idx="minor">
+            <a:schemeClr val="lt1"/>
+          </a:fontRef>
+        </p:style>
+        <p:txBody>
+          <a:bodyPr rtlCol="0" anchor="ctr"/>
+          <a:lstStyle/>
+          <a:p>
+            <a:pPr algn="ctr"/>
+            <a:r>
+              <a:rPr lang="en-US" dirty="0"/>
+              <a:t>Android App</a:t>
+            </a:r>
+          </a:p>
+        </p:txBody>
+      </p:sp>
+      <p:sp>
+        <p:nvSpPr>
+          <p:cNvPr id="39" name="Rectangle 38">
+            <a:extLst>
+              <a:ext uri="{FF2B5EF4-FFF2-40B4-BE49-F238E27FC236}">
+                <a16:creationId xmlns:a16="http://schemas.microsoft.com/office/drawing/2014/main" id="{DDC382A8-1BB6-8E41-9F0C-6677ABA2C9D4}"/>
+              </a:ext>
+            </a:extLst>
+          </p:cNvPr>
+          <p:cNvSpPr/>
+          <p:nvPr/>
+        </p:nvSpPr>
+        <p:spPr>
+          <a:xfrm>
+            <a:off x="7932967" y="1814235"/>
+            <a:ext cx="2001078" cy="954157"/>
+          </a:xfrm>
+          <a:prstGeom prst="rect">
+            <a:avLst/>
+          </a:prstGeom>
+        </p:spPr>
+        <p:style>
+          <a:lnRef idx="2">
+            <a:schemeClr val="accent1">
+              <a:shade val="50000"/>
+            </a:schemeClr>
+          </a:lnRef>
+          <a:fillRef idx="1">
+            <a:schemeClr val="accent1"/>
+          </a:fillRef>
+          <a:effectRef idx="0">
+            <a:schemeClr val="accent1"/>
+          </a:effectRef>
+          <a:fontRef idx="minor">
+            <a:schemeClr val="lt1"/>
+          </a:fontRef>
+        </p:style>
+        <p:txBody>
+          <a:bodyPr rtlCol="0" anchor="ctr"/>
+          <a:lstStyle/>
+          <a:p>
+            <a:pPr algn="ctr"/>
+            <a:r>
+              <a:rPr lang="en-US" dirty="0"/>
+              <a:t>Web App</a:t>
+            </a:r>
+          </a:p>
+        </p:txBody>
+      </p:sp>
+      <p:cxnSp>
+        <p:nvCxnSpPr>
+          <p:cNvPr id="40" name="Straight Arrow Connector 39">
+            <a:extLst>
+              <a:ext uri="{FF2B5EF4-FFF2-40B4-BE49-F238E27FC236}">
+                <a16:creationId xmlns:a16="http://schemas.microsoft.com/office/drawing/2014/main" id="{BA33C913-EC6F-F94B-B0E4-DE9B3C99E008}"/>
+              </a:ext>
+            </a:extLst>
+          </p:cNvPr>
+          <p:cNvCxnSpPr>
+            <a:cxnSpLocks/>
+            <a:stCxn id="36" idx="2"/>
+          </p:cNvCxnSpPr>
+          <p:nvPr/>
+        </p:nvCxnSpPr>
+        <p:spPr>
+          <a:xfrm>
+            <a:off x="3258494" y="2768392"/>
+            <a:ext cx="2674473" cy="1451963"/>
+          </a:xfrm>
+          <a:prstGeom prst="straightConnector1">
+            <a:avLst/>
+          </a:prstGeom>
+          <a:ln w="76200">
+            <a:solidFill>
+              <a:schemeClr val="tx1"/>
+            </a:solidFill>
+            <a:headEnd type="triangle"/>
+            <a:tailEnd type="none"/>
+          </a:ln>
+        </p:spPr>
+        <p:style>
+          <a:lnRef idx="1">
+            <a:schemeClr val="accent1"/>
+          </a:lnRef>
+          <a:fillRef idx="0">
+            <a:schemeClr val="accent1"/>
+          </a:fillRef>
+          <a:effectRef idx="0">
+            <a:schemeClr val="accent1"/>
+          </a:effectRef>
+          <a:fontRef idx="minor">
+            <a:schemeClr val="tx1"/>
+          </a:fontRef>
+        </p:style>
+      </p:cxnSp>
+      <p:cxnSp>
+        <p:nvCxnSpPr>
+          <p:cNvPr id="42" name="Straight Arrow Connector 41">
+            <a:extLst>
+              <a:ext uri="{FF2B5EF4-FFF2-40B4-BE49-F238E27FC236}">
+                <a16:creationId xmlns:a16="http://schemas.microsoft.com/office/drawing/2014/main" id="{63992E07-26C2-C748-8EAF-2BF4689E9AA5}"/>
+              </a:ext>
+            </a:extLst>
+          </p:cNvPr>
+          <p:cNvCxnSpPr>
+            <a:cxnSpLocks/>
+            <a:stCxn id="37" idx="2"/>
+            <a:endCxn id="7" idx="0"/>
+          </p:cNvCxnSpPr>
+          <p:nvPr/>
+        </p:nvCxnSpPr>
+        <p:spPr>
+          <a:xfrm>
+            <a:off x="6096000" y="2768392"/>
+            <a:ext cx="0" cy="1451963"/>
+          </a:xfrm>
+          <a:prstGeom prst="straightConnector1">
+            <a:avLst/>
+          </a:prstGeom>
+          <a:ln w="76200">
+            <a:solidFill>
+              <a:schemeClr val="tx1"/>
+            </a:solidFill>
+            <a:headEnd type="triangle"/>
+            <a:tailEnd type="none"/>
+          </a:ln>
+        </p:spPr>
+        <p:style>
+          <a:lnRef idx="1">
+            <a:schemeClr val="accent1"/>
+          </a:lnRef>
+          <a:fillRef idx="0">
+            <a:schemeClr val="accent1"/>
+          </a:fillRef>
+          <a:effectRef idx="0">
+            <a:schemeClr val="accent1"/>
+          </a:effectRef>
+          <a:fontRef idx="minor">
+            <a:schemeClr val="tx1"/>
+          </a:fontRef>
+        </p:style>
+      </p:cxnSp>
+      <p:cxnSp>
+        <p:nvCxnSpPr>
+          <p:cNvPr id="43" name="Straight Arrow Connector 42">
+            <a:extLst>
+              <a:ext uri="{FF2B5EF4-FFF2-40B4-BE49-F238E27FC236}">
+                <a16:creationId xmlns:a16="http://schemas.microsoft.com/office/drawing/2014/main" id="{230B9394-EF22-E948-868C-2181035EF544}"/>
+              </a:ext>
+            </a:extLst>
+          </p:cNvPr>
+          <p:cNvCxnSpPr>
+            <a:cxnSpLocks/>
+            <a:stCxn id="39" idx="2"/>
+          </p:cNvCxnSpPr>
+          <p:nvPr/>
+        </p:nvCxnSpPr>
+        <p:spPr>
+          <a:xfrm flipH="1">
+            <a:off x="6254255" y="2768392"/>
+            <a:ext cx="2679251" cy="1451963"/>
+          </a:xfrm>
+          <a:prstGeom prst="straightConnector1">
+            <a:avLst/>
+          </a:prstGeom>
+          <a:ln w="76200">
+            <a:solidFill>
+              <a:schemeClr val="tx1"/>
+            </a:solidFill>
+            <a:headEnd type="triangle"/>
+            <a:tailEnd type="none"/>
+          </a:ln>
+        </p:spPr>
+        <p:style>
+          <a:lnRef idx="1">
+            <a:schemeClr val="accent1"/>
+          </a:lnRef>
+          <a:fillRef idx="0">
+            <a:schemeClr val="accent1"/>
+          </a:fillRef>
+          <a:effectRef idx="0">
+            <a:schemeClr val="accent1"/>
+          </a:effectRef>
+          <a:fontRef idx="minor">
+            <a:schemeClr val="tx1"/>
+          </a:fontRef>
+        </p:style>
+      </p:cxnSp>
+    </p:spTree>
+    <p:extLst>
+      <p:ext uri="{BB962C8B-B14F-4D97-AF65-F5344CB8AC3E}">
+        <p14:creationId xmlns:p14="http://schemas.microsoft.com/office/powerpoint/2010/main" val="1622517864"/>
+      </p:ext>
+    </p:extLst>
+  </p:cSld>
+  <p:clrMapOvr>
+    <a:masterClrMapping/>
+  </p:clrMapOvr>
+</p:sld>
+</file>
+
 <file path=ppt/theme/theme1.xml><?xml version="1.0" encoding="utf-8"?>
 <a:theme xmlns:a="http://schemas.openxmlformats.org/drawingml/2006/main" name="Office Theme">
   <a:themeElements>

</xml_diff>